<commit_message>
Created presentation power point
</commit_message>
<xml_diff>
--- a/Dissertacao/4. Defesa da dissertação.pptx
+++ b/Dissertacao/4. Defesa da dissertação.pptx
@@ -5,7 +5,7 @@
     <p:sldMasterId id="2147484007" r:id="rId1"/>
   </p:sldMasterIdLst>
   <p:notesMasterIdLst>
-    <p:notesMasterId r:id="rId25"/>
+    <p:notesMasterId r:id="rId29"/>
   </p:notesMasterIdLst>
   <p:sldIdLst>
     <p:sldId id="264" r:id="rId2"/>
@@ -19,18 +19,22 @@
     <p:sldId id="301" r:id="rId10"/>
     <p:sldId id="302" r:id="rId11"/>
     <p:sldId id="292" r:id="rId12"/>
-    <p:sldId id="297" r:id="rId13"/>
-    <p:sldId id="304" r:id="rId14"/>
-    <p:sldId id="305" r:id="rId15"/>
-    <p:sldId id="306" r:id="rId16"/>
-    <p:sldId id="298" r:id="rId17"/>
-    <p:sldId id="308" r:id="rId18"/>
-    <p:sldId id="293" r:id="rId19"/>
-    <p:sldId id="294" r:id="rId20"/>
-    <p:sldId id="295" r:id="rId21"/>
-    <p:sldId id="309" r:id="rId22"/>
-    <p:sldId id="310" r:id="rId23"/>
-    <p:sldId id="311" r:id="rId24"/>
+    <p:sldId id="313" r:id="rId13"/>
+    <p:sldId id="312" r:id="rId14"/>
+    <p:sldId id="297" r:id="rId15"/>
+    <p:sldId id="304" r:id="rId16"/>
+    <p:sldId id="305" r:id="rId17"/>
+    <p:sldId id="306" r:id="rId18"/>
+    <p:sldId id="298" r:id="rId19"/>
+    <p:sldId id="293" r:id="rId20"/>
+    <p:sldId id="294" r:id="rId21"/>
+    <p:sldId id="295" r:id="rId22"/>
+    <p:sldId id="316" r:id="rId23"/>
+    <p:sldId id="309" r:id="rId24"/>
+    <p:sldId id="310" r:id="rId25"/>
+    <p:sldId id="314" r:id="rId26"/>
+    <p:sldId id="311" r:id="rId27"/>
+    <p:sldId id="315" r:id="rId28"/>
   </p:sldIdLst>
   <p:sldSz cx="12192000" cy="6858000"/>
   <p:notesSz cx="6858000" cy="9144000"/>
@@ -219,7 +223,7 @@
           <a:p>
             <a:fld id="{3C35305E-D46C-4326-9A29-B8B50EE59D60}" type="datetimeFigureOut">
               <a:rPr lang="pt-PT" smtClean="0"/>
-              <a:t>28/06/2016</a:t>
+              <a:t>29/06/2016</a:t>
             </a:fld>
             <a:endParaRPr lang="pt-PT"/>
           </a:p>
@@ -906,6 +910,258 @@
 </p:notes>
 </file>
 
+<file path=ppt/notesSlides/notesSlide6.xml><?xml version="1.0" encoding="utf-8"?>
+<p:notes xmlns:a="http://schemas.openxmlformats.org/drawingml/2006/main" xmlns:r="http://schemas.openxmlformats.org/officeDocument/2006/relationships" xmlns:p="http://schemas.openxmlformats.org/presentationml/2006/main">
+  <p:cSld>
+    <p:spTree>
+      <p:nvGrpSpPr>
+        <p:cNvPr id="1" name=""/>
+        <p:cNvGrpSpPr/>
+        <p:nvPr/>
+      </p:nvGrpSpPr>
+      <p:grpSpPr>
+        <a:xfrm>
+          <a:off x="0" y="0"/>
+          <a:ext cx="0" cy="0"/>
+          <a:chOff x="0" y="0"/>
+          <a:chExt cx="0" cy="0"/>
+        </a:xfrm>
+      </p:grpSpPr>
+      <p:sp>
+        <p:nvSpPr>
+          <p:cNvPr id="2" name="Marcador de Posição da Imagem do Diapositivo 1"/>
+          <p:cNvSpPr>
+            <a:spLocks noGrp="1" noRot="1" noChangeAspect="1"/>
+          </p:cNvSpPr>
+          <p:nvPr>
+            <p:ph type="sldImg"/>
+          </p:nvPr>
+        </p:nvSpPr>
+        <p:spPr/>
+      </p:sp>
+      <p:sp>
+        <p:nvSpPr>
+          <p:cNvPr id="3" name="Marcador de Posição de Notas 2"/>
+          <p:cNvSpPr>
+            <a:spLocks noGrp="1"/>
+          </p:cNvSpPr>
+          <p:nvPr>
+            <p:ph type="body" idx="1"/>
+          </p:nvPr>
+        </p:nvSpPr>
+        <p:spPr/>
+        <p:txBody>
+          <a:bodyPr/>
+          <a:lstStyle/>
+          <a:p>
+            <a:endParaRPr lang="pt-PT" dirty="0"/>
+          </a:p>
+        </p:txBody>
+      </p:sp>
+      <p:sp>
+        <p:nvSpPr>
+          <p:cNvPr id="4" name="Marcador de Posição do Número do Diapositivo 3"/>
+          <p:cNvSpPr>
+            <a:spLocks noGrp="1"/>
+          </p:cNvSpPr>
+          <p:nvPr>
+            <p:ph type="sldNum" sz="quarter" idx="10"/>
+          </p:nvPr>
+        </p:nvSpPr>
+        <p:spPr/>
+        <p:txBody>
+          <a:bodyPr/>
+          <a:lstStyle/>
+          <a:p>
+            <a:fld id="{A37DC0E3-D7D0-4B7C-A327-D399D589CBC5}" type="slidenum">
+              <a:rPr lang="pt-PT" smtClean="0"/>
+              <a:t>12</a:t>
+            </a:fld>
+            <a:endParaRPr lang="pt-PT"/>
+          </a:p>
+        </p:txBody>
+      </p:sp>
+    </p:spTree>
+    <p:extLst>
+      <p:ext uri="{BB962C8B-B14F-4D97-AF65-F5344CB8AC3E}">
+        <p14:creationId xmlns:p14="http://schemas.microsoft.com/office/powerpoint/2010/main" val="3718984149"/>
+      </p:ext>
+    </p:extLst>
+  </p:cSld>
+  <p:clrMapOvr>
+    <a:masterClrMapping/>
+  </p:clrMapOvr>
+</p:notes>
+</file>
+
+<file path=ppt/notesSlides/notesSlide7.xml><?xml version="1.0" encoding="utf-8"?>
+<p:notes xmlns:a="http://schemas.openxmlformats.org/drawingml/2006/main" xmlns:r="http://schemas.openxmlformats.org/officeDocument/2006/relationships" xmlns:p="http://schemas.openxmlformats.org/presentationml/2006/main">
+  <p:cSld>
+    <p:spTree>
+      <p:nvGrpSpPr>
+        <p:cNvPr id="1" name=""/>
+        <p:cNvGrpSpPr/>
+        <p:nvPr/>
+      </p:nvGrpSpPr>
+      <p:grpSpPr>
+        <a:xfrm>
+          <a:off x="0" y="0"/>
+          <a:ext cx="0" cy="0"/>
+          <a:chOff x="0" y="0"/>
+          <a:chExt cx="0" cy="0"/>
+        </a:xfrm>
+      </p:grpSpPr>
+      <p:sp>
+        <p:nvSpPr>
+          <p:cNvPr id="2" name="Marcador de Posição da Imagem do Diapositivo 1"/>
+          <p:cNvSpPr>
+            <a:spLocks noGrp="1" noRot="1" noChangeAspect="1"/>
+          </p:cNvSpPr>
+          <p:nvPr>
+            <p:ph type="sldImg"/>
+          </p:nvPr>
+        </p:nvSpPr>
+        <p:spPr/>
+      </p:sp>
+      <p:sp>
+        <p:nvSpPr>
+          <p:cNvPr id="3" name="Marcador de Posição de Notas 2"/>
+          <p:cNvSpPr>
+            <a:spLocks noGrp="1"/>
+          </p:cNvSpPr>
+          <p:nvPr>
+            <p:ph type="body" idx="1"/>
+          </p:nvPr>
+        </p:nvSpPr>
+        <p:spPr/>
+        <p:txBody>
+          <a:bodyPr/>
+          <a:lstStyle/>
+          <a:p>
+            <a:endParaRPr lang="pt-PT" dirty="0"/>
+          </a:p>
+        </p:txBody>
+      </p:sp>
+      <p:sp>
+        <p:nvSpPr>
+          <p:cNvPr id="4" name="Marcador de Posição do Número do Diapositivo 3"/>
+          <p:cNvSpPr>
+            <a:spLocks noGrp="1"/>
+          </p:cNvSpPr>
+          <p:nvPr>
+            <p:ph type="sldNum" sz="quarter" idx="10"/>
+          </p:nvPr>
+        </p:nvSpPr>
+        <p:spPr/>
+        <p:txBody>
+          <a:bodyPr/>
+          <a:lstStyle/>
+          <a:p>
+            <a:fld id="{A37DC0E3-D7D0-4B7C-A327-D399D589CBC5}" type="slidenum">
+              <a:rPr lang="pt-PT" smtClean="0"/>
+              <a:t>13</a:t>
+            </a:fld>
+            <a:endParaRPr lang="pt-PT"/>
+          </a:p>
+        </p:txBody>
+      </p:sp>
+    </p:spTree>
+    <p:extLst>
+      <p:ext uri="{BB962C8B-B14F-4D97-AF65-F5344CB8AC3E}">
+        <p14:creationId xmlns:p14="http://schemas.microsoft.com/office/powerpoint/2010/main" val="49506229"/>
+      </p:ext>
+    </p:extLst>
+  </p:cSld>
+  <p:clrMapOvr>
+    <a:masterClrMapping/>
+  </p:clrMapOvr>
+</p:notes>
+</file>
+
+<file path=ppt/notesSlides/notesSlide8.xml><?xml version="1.0" encoding="utf-8"?>
+<p:notes xmlns:a="http://schemas.openxmlformats.org/drawingml/2006/main" xmlns:r="http://schemas.openxmlformats.org/officeDocument/2006/relationships" xmlns:p="http://schemas.openxmlformats.org/presentationml/2006/main">
+  <p:cSld>
+    <p:spTree>
+      <p:nvGrpSpPr>
+        <p:cNvPr id="1" name=""/>
+        <p:cNvGrpSpPr/>
+        <p:nvPr/>
+      </p:nvGrpSpPr>
+      <p:grpSpPr>
+        <a:xfrm>
+          <a:off x="0" y="0"/>
+          <a:ext cx="0" cy="0"/>
+          <a:chOff x="0" y="0"/>
+          <a:chExt cx="0" cy="0"/>
+        </a:xfrm>
+      </p:grpSpPr>
+      <p:sp>
+        <p:nvSpPr>
+          <p:cNvPr id="2" name="Marcador de Posição da Imagem do Diapositivo 1"/>
+          <p:cNvSpPr>
+            <a:spLocks noGrp="1" noRot="1" noChangeAspect="1"/>
+          </p:cNvSpPr>
+          <p:nvPr>
+            <p:ph type="sldImg"/>
+          </p:nvPr>
+        </p:nvSpPr>
+        <p:spPr/>
+      </p:sp>
+      <p:sp>
+        <p:nvSpPr>
+          <p:cNvPr id="3" name="Marcador de Posição de Notas 2"/>
+          <p:cNvSpPr>
+            <a:spLocks noGrp="1"/>
+          </p:cNvSpPr>
+          <p:nvPr>
+            <p:ph type="body" idx="1"/>
+          </p:nvPr>
+        </p:nvSpPr>
+        <p:spPr/>
+        <p:txBody>
+          <a:bodyPr/>
+          <a:lstStyle/>
+          <a:p>
+            <a:endParaRPr lang="pt-PT" dirty="0"/>
+          </a:p>
+        </p:txBody>
+      </p:sp>
+      <p:sp>
+        <p:nvSpPr>
+          <p:cNvPr id="4" name="Marcador de Posição do Número do Diapositivo 3"/>
+          <p:cNvSpPr>
+            <a:spLocks noGrp="1"/>
+          </p:cNvSpPr>
+          <p:nvPr>
+            <p:ph type="sldNum" sz="quarter" idx="10"/>
+          </p:nvPr>
+        </p:nvSpPr>
+        <p:spPr/>
+        <p:txBody>
+          <a:bodyPr/>
+          <a:lstStyle/>
+          <a:p>
+            <a:fld id="{A37DC0E3-D7D0-4B7C-A327-D399D589CBC5}" type="slidenum">
+              <a:rPr lang="pt-PT" smtClean="0"/>
+              <a:t>27</a:t>
+            </a:fld>
+            <a:endParaRPr lang="pt-PT"/>
+          </a:p>
+        </p:txBody>
+      </p:sp>
+    </p:spTree>
+    <p:extLst>
+      <p:ext uri="{BB962C8B-B14F-4D97-AF65-F5344CB8AC3E}">
+        <p14:creationId xmlns:p14="http://schemas.microsoft.com/office/powerpoint/2010/main" val="3986728422"/>
+      </p:ext>
+    </p:extLst>
+  </p:cSld>
+  <p:clrMapOvr>
+    <a:masterClrMapping/>
+  </p:clrMapOvr>
+</p:notes>
+</file>
+
 <file path=ppt/slideLayouts/slideLayout1.xml><?xml version="1.0" encoding="utf-8"?>
 <p:sldLayout xmlns:a="http://schemas.openxmlformats.org/drawingml/2006/main" xmlns:r="http://schemas.openxmlformats.org/officeDocument/2006/relationships" xmlns:p="http://schemas.openxmlformats.org/presentationml/2006/main" type="title" preserve="1">
   <p:cSld name="Diapositivo de título">
@@ -1180,7 +1436,7 @@
           <a:p>
             <a:fld id="{B8C1D41B-FD9D-477E-A7D3-2D0500536254}" type="datetimeFigureOut">
               <a:rPr lang="pt-PT" smtClean="0"/>
-              <a:t>28/06/2016</a:t>
+              <a:t>29/06/2016</a:t>
             </a:fld>
             <a:endParaRPr lang="pt-PT"/>
           </a:p>
@@ -1594,7 +1850,7 @@
           <a:p>
             <a:fld id="{B8C1D41B-FD9D-477E-A7D3-2D0500536254}" type="datetimeFigureOut">
               <a:rPr lang="pt-PT" smtClean="0"/>
-              <a:t>28/06/2016</a:t>
+              <a:t>29/06/2016</a:t>
             </a:fld>
             <a:endParaRPr lang="pt-PT"/>
           </a:p>
@@ -1930,7 +2186,7 @@
           <a:p>
             <a:fld id="{B8C1D41B-FD9D-477E-A7D3-2D0500536254}" type="datetimeFigureOut">
               <a:rPr lang="pt-PT" smtClean="0"/>
-              <a:t>28/06/2016</a:t>
+              <a:t>29/06/2016</a:t>
             </a:fld>
             <a:endParaRPr lang="pt-PT"/>
           </a:p>
@@ -2335,7 +2591,7 @@
           <a:p>
             <a:fld id="{B8C1D41B-FD9D-477E-A7D3-2D0500536254}" type="datetimeFigureOut">
               <a:rPr lang="pt-PT" smtClean="0"/>
-              <a:t>28/06/2016</a:t>
+              <a:t>29/06/2016</a:t>
             </a:fld>
             <a:endParaRPr lang="pt-PT"/>
           </a:p>
@@ -2903,7 +3159,7 @@
           <a:p>
             <a:fld id="{B8C1D41B-FD9D-477E-A7D3-2D0500536254}" type="datetimeFigureOut">
               <a:rPr lang="pt-PT" smtClean="0"/>
-              <a:t>28/06/2016</a:t>
+              <a:t>29/06/2016</a:t>
             </a:fld>
             <a:endParaRPr lang="pt-PT"/>
           </a:p>
@@ -3584,7 +3840,7 @@
           <a:p>
             <a:fld id="{B8C1D41B-FD9D-477E-A7D3-2D0500536254}" type="datetimeFigureOut">
               <a:rPr lang="pt-PT" smtClean="0"/>
-              <a:t>28/06/2016</a:t>
+              <a:t>29/06/2016</a:t>
             </a:fld>
             <a:endParaRPr lang="pt-PT"/>
           </a:p>
@@ -4497,7 +4753,7 @@
           <a:p>
             <a:fld id="{B8C1D41B-FD9D-477E-A7D3-2D0500536254}" type="datetimeFigureOut">
               <a:rPr lang="pt-PT" smtClean="0"/>
-              <a:t>28/06/2016</a:t>
+              <a:t>29/06/2016</a:t>
             </a:fld>
             <a:endParaRPr lang="pt-PT"/>
           </a:p>
@@ -4810,7 +5066,7 @@
           <a:p>
             <a:fld id="{B8C1D41B-FD9D-477E-A7D3-2D0500536254}" type="datetimeFigureOut">
               <a:rPr lang="pt-PT" smtClean="0"/>
-              <a:t>28/06/2016</a:t>
+              <a:t>29/06/2016</a:t>
             </a:fld>
             <a:endParaRPr lang="pt-PT"/>
           </a:p>
@@ -5074,7 +5330,7 @@
           <a:p>
             <a:fld id="{B8C1D41B-FD9D-477E-A7D3-2D0500536254}" type="datetimeFigureOut">
               <a:rPr lang="pt-PT" smtClean="0"/>
-              <a:t>28/06/2016</a:t>
+              <a:t>29/06/2016</a:t>
             </a:fld>
             <a:endParaRPr lang="pt-PT"/>
           </a:p>
@@ -5397,7 +5653,7 @@
           <a:p>
             <a:fld id="{B8C1D41B-FD9D-477E-A7D3-2D0500536254}" type="datetimeFigureOut">
               <a:rPr lang="pt-PT" smtClean="0"/>
-              <a:t>28/06/2016</a:t>
+              <a:t>29/06/2016</a:t>
             </a:fld>
             <a:endParaRPr lang="pt-PT"/>
           </a:p>
@@ -5786,7 +6042,7 @@
           <a:p>
             <a:fld id="{B8C1D41B-FD9D-477E-A7D3-2D0500536254}" type="datetimeFigureOut">
               <a:rPr lang="pt-PT" smtClean="0"/>
-              <a:t>28/06/2016</a:t>
+              <a:t>29/06/2016</a:t>
             </a:fld>
             <a:endParaRPr lang="pt-PT"/>
           </a:p>
@@ -6162,7 +6418,7 @@
           <a:p>
             <a:fld id="{B8C1D41B-FD9D-477E-A7D3-2D0500536254}" type="datetimeFigureOut">
               <a:rPr lang="pt-PT" smtClean="0"/>
-              <a:t>28/06/2016</a:t>
+              <a:t>29/06/2016</a:t>
             </a:fld>
             <a:endParaRPr lang="pt-PT"/>
           </a:p>
@@ -6668,7 +6924,7 @@
           <a:p>
             <a:fld id="{B8C1D41B-FD9D-477E-A7D3-2D0500536254}" type="datetimeFigureOut">
               <a:rPr lang="pt-PT" smtClean="0"/>
-              <a:t>28/06/2016</a:t>
+              <a:t>29/06/2016</a:t>
             </a:fld>
             <a:endParaRPr lang="pt-PT"/>
           </a:p>
@@ -6925,7 +7181,7 @@
           <a:p>
             <a:fld id="{B8C1D41B-FD9D-477E-A7D3-2D0500536254}" type="datetimeFigureOut">
               <a:rPr lang="pt-PT" smtClean="0"/>
-              <a:t>28/06/2016</a:t>
+              <a:t>29/06/2016</a:t>
             </a:fld>
             <a:endParaRPr lang="pt-PT"/>
           </a:p>
@@ -7088,7 +7344,7 @@
           <a:p>
             <a:fld id="{B8C1D41B-FD9D-477E-A7D3-2D0500536254}" type="datetimeFigureOut">
               <a:rPr lang="pt-PT" smtClean="0"/>
-              <a:t>28/06/2016</a:t>
+              <a:t>29/06/2016</a:t>
             </a:fld>
             <a:endParaRPr lang="pt-PT"/>
           </a:p>
@@ -7478,7 +7734,7 @@
           <a:p>
             <a:fld id="{B8C1D41B-FD9D-477E-A7D3-2D0500536254}" type="datetimeFigureOut">
               <a:rPr lang="pt-PT" smtClean="0"/>
-              <a:t>28/06/2016</a:t>
+              <a:t>29/06/2016</a:t>
             </a:fld>
             <a:endParaRPr lang="pt-PT"/>
           </a:p>
@@ -7887,7 +8143,7 @@
           <a:p>
             <a:fld id="{B8C1D41B-FD9D-477E-A7D3-2D0500536254}" type="datetimeFigureOut">
               <a:rPr lang="pt-PT" smtClean="0"/>
-              <a:t>28/06/2016</a:t>
+              <a:t>29/06/2016</a:t>
             </a:fld>
             <a:endParaRPr lang="pt-PT"/>
           </a:p>
@@ -8134,7 +8390,7 @@
           <a:p>
             <a:fld id="{B8C1D41B-FD9D-477E-A7D3-2D0500536254}" type="datetimeFigureOut">
               <a:rPr lang="pt-PT" smtClean="0"/>
-              <a:t>28/06/2016</a:t>
+              <a:t>29/06/2016</a:t>
             </a:fld>
             <a:endParaRPr lang="pt-PT"/>
           </a:p>
@@ -8961,6 +9217,52 @@
           </a:p>
         </p:txBody>
       </p:sp>
+      <p:sp>
+        <p:nvSpPr>
+          <p:cNvPr id="8" name="Oval 7"/>
+          <p:cNvSpPr/>
+          <p:nvPr/>
+        </p:nvSpPr>
+        <p:spPr>
+          <a:xfrm>
+            <a:off x="10972457" y="875957"/>
+            <a:ext cx="828000" cy="828000"/>
+          </a:xfrm>
+          <a:prstGeom prst="ellipse">
+            <a:avLst/>
+          </a:prstGeom>
+          <a:noFill/>
+          <a:ln w="50800">
+            <a:solidFill>
+              <a:schemeClr val="tx1"/>
+            </a:solidFill>
+          </a:ln>
+        </p:spPr>
+        <p:style>
+          <a:lnRef idx="2">
+            <a:schemeClr val="accent1">
+              <a:shade val="50000"/>
+            </a:schemeClr>
+          </a:lnRef>
+          <a:fillRef idx="1">
+            <a:schemeClr val="accent1"/>
+          </a:fillRef>
+          <a:effectRef idx="0">
+            <a:schemeClr val="accent1"/>
+          </a:effectRef>
+          <a:fontRef idx="minor">
+            <a:schemeClr val="lt1"/>
+          </a:fontRef>
+        </p:style>
+        <p:txBody>
+          <a:bodyPr rtlCol="0" anchor="ctr"/>
+          <a:lstStyle/>
+          <a:p>
+            <a:pPr algn="ctr"/>
+            <a:endParaRPr lang="pt-PT"/>
+          </a:p>
+        </p:txBody>
+      </p:sp>
     </p:spTree>
     <p:extLst>
       <p:ext uri="{BB962C8B-B14F-4D97-AF65-F5344CB8AC3E}">
@@ -9075,6 +9377,52 @@
           </a:p>
         </p:txBody>
       </p:sp>
+      <p:sp>
+        <p:nvSpPr>
+          <p:cNvPr id="4" name="Oval 3"/>
+          <p:cNvSpPr/>
+          <p:nvPr/>
+        </p:nvSpPr>
+        <p:spPr>
+          <a:xfrm>
+            <a:off x="10972457" y="875957"/>
+            <a:ext cx="828000" cy="828000"/>
+          </a:xfrm>
+          <a:prstGeom prst="ellipse">
+            <a:avLst/>
+          </a:prstGeom>
+          <a:noFill/>
+          <a:ln w="50800">
+            <a:solidFill>
+              <a:schemeClr val="tx1"/>
+            </a:solidFill>
+          </a:ln>
+        </p:spPr>
+        <p:style>
+          <a:lnRef idx="2">
+            <a:schemeClr val="accent1">
+              <a:shade val="50000"/>
+            </a:schemeClr>
+          </a:lnRef>
+          <a:fillRef idx="1">
+            <a:schemeClr val="accent1"/>
+          </a:fillRef>
+          <a:effectRef idx="0">
+            <a:schemeClr val="accent1"/>
+          </a:effectRef>
+          <a:fontRef idx="minor">
+            <a:schemeClr val="lt1"/>
+          </a:fontRef>
+        </p:style>
+        <p:txBody>
+          <a:bodyPr rtlCol="0" anchor="ctr"/>
+          <a:lstStyle/>
+          <a:p>
+            <a:pPr algn="ctr"/>
+            <a:endParaRPr lang="pt-PT"/>
+          </a:p>
+        </p:txBody>
+      </p:sp>
     </p:spTree>
     <p:extLst>
       <p:ext uri="{BB962C8B-B14F-4D97-AF65-F5344CB8AC3E}">
@@ -9089,6 +9437,580 @@
 </file>
 
 <file path=ppt/slides/slide12.xml><?xml version="1.0" encoding="utf-8"?>
+<p:sld xmlns:a="http://schemas.openxmlformats.org/drawingml/2006/main" xmlns:r="http://schemas.openxmlformats.org/officeDocument/2006/relationships" xmlns:p="http://schemas.openxmlformats.org/presentationml/2006/main">
+  <p:cSld>
+    <p:spTree>
+      <p:nvGrpSpPr>
+        <p:cNvPr id="1" name=""/>
+        <p:cNvGrpSpPr/>
+        <p:nvPr/>
+      </p:nvGrpSpPr>
+      <p:grpSpPr>
+        <a:xfrm>
+          <a:off x="0" y="0"/>
+          <a:ext cx="0" cy="0"/>
+          <a:chOff x="0" y="0"/>
+          <a:chExt cx="0" cy="0"/>
+        </a:xfrm>
+      </p:grpSpPr>
+      <p:sp>
+        <p:nvSpPr>
+          <p:cNvPr id="6" name="Retângulo 5"/>
+          <p:cNvSpPr/>
+          <p:nvPr/>
+        </p:nvSpPr>
+        <p:spPr>
+          <a:xfrm>
+            <a:off x="10580914" y="604157"/>
+            <a:ext cx="1611086" cy="1371600"/>
+          </a:xfrm>
+          <a:prstGeom prst="rect">
+            <a:avLst/>
+          </a:prstGeom>
+          <a:noFill/>
+          <a:ln>
+            <a:noFill/>
+          </a:ln>
+        </p:spPr>
+        <p:style>
+          <a:lnRef idx="2">
+            <a:schemeClr val="accent1">
+              <a:shade val="50000"/>
+            </a:schemeClr>
+          </a:lnRef>
+          <a:fillRef idx="1">
+            <a:schemeClr val="accent1"/>
+          </a:fillRef>
+          <a:effectRef idx="0">
+            <a:schemeClr val="accent1"/>
+          </a:effectRef>
+          <a:fontRef idx="minor">
+            <a:schemeClr val="lt1"/>
+          </a:fontRef>
+        </p:style>
+        <p:txBody>
+          <a:bodyPr rtlCol="0" anchor="ctr"/>
+          <a:lstStyle/>
+          <a:p>
+            <a:pPr algn="ctr"/>
+            <a:r>
+              <a:rPr lang="en-GB" sz="3200" dirty="0"/>
+              <a:t>1</a:t>
+            </a:r>
+            <a:endParaRPr lang="pt-PT" sz="3200" dirty="0"/>
+          </a:p>
+        </p:txBody>
+      </p:sp>
+      <p:pic>
+        <p:nvPicPr>
+          <p:cNvPr id="4" name="Imagem 3" descr="C:\Users\joo_c\Desktop\Indexacao-de-Documentos-Clinicos\Indexacao-de-Documentos-Clinicos\Dissertacao\images\eer_model.png"/>
+          <p:cNvPicPr>
+            <a:picLocks noChangeAspect="1"/>
+          </p:cNvPicPr>
+          <p:nvPr/>
+        </p:nvPicPr>
+        <p:blipFill rotWithShape="1">
+          <a:blip r:embed="rId3" cstate="print">
+            <a:extLst>
+              <a:ext uri="{28A0092B-C50C-407E-A947-70E740481C1C}">
+                <a14:useLocalDpi xmlns:a14="http://schemas.microsoft.com/office/drawing/2010/main" val="0"/>
+              </a:ext>
+            </a:extLst>
+          </a:blip>
+          <a:srcRect l="42795" t="18454" r="47150" b="71039"/>
+          <a:stretch/>
+        </p:blipFill>
+        <p:spPr bwMode="auto">
+          <a:xfrm>
+            <a:off x="808264" y="1975757"/>
+            <a:ext cx="2800350" cy="3522741"/>
+          </a:xfrm>
+          <a:prstGeom prst="rect">
+            <a:avLst/>
+          </a:prstGeom>
+          <a:noFill/>
+          <a:ln>
+            <a:noFill/>
+          </a:ln>
+          <a:extLst>
+            <a:ext uri="{53640926-AAD7-44D8-BBD7-CCE9431645EC}">
+              <a14:shadowObscured xmlns:a14="http://schemas.microsoft.com/office/drawing/2010/main"/>
+            </a:ext>
+          </a:extLst>
+        </p:spPr>
+      </p:pic>
+      <p:pic>
+        <p:nvPicPr>
+          <p:cNvPr id="8" name="Imagem 7" descr="C:\Users\joo_c\Desktop\Indexacao-de-Documentos-Clinicos\Indexacao-de-Documentos-Clinicos\Dissertacao\images\eer_model.png"/>
+          <p:cNvPicPr>
+            <a:picLocks noChangeAspect="1"/>
+          </p:cNvPicPr>
+          <p:nvPr/>
+        </p:nvPicPr>
+        <p:blipFill rotWithShape="1">
+          <a:blip r:embed="rId3" cstate="print">
+            <a:extLst>
+              <a:ext uri="{28A0092B-C50C-407E-A947-70E740481C1C}">
+                <a14:useLocalDpi xmlns:a14="http://schemas.microsoft.com/office/drawing/2010/main" val="0"/>
+              </a:ext>
+            </a:extLst>
+          </a:blip>
+          <a:srcRect l="42795" t="34651" r="46838" b="53150"/>
+          <a:stretch/>
+        </p:blipFill>
+        <p:spPr bwMode="auto">
+          <a:xfrm>
+            <a:off x="4440010" y="1856776"/>
+            <a:ext cx="2654754" cy="3760699"/>
+          </a:xfrm>
+          <a:prstGeom prst="rect">
+            <a:avLst/>
+          </a:prstGeom>
+          <a:noFill/>
+          <a:ln>
+            <a:noFill/>
+          </a:ln>
+          <a:extLst>
+            <a:ext uri="{53640926-AAD7-44D8-BBD7-CCE9431645EC}">
+              <a14:shadowObscured xmlns:a14="http://schemas.microsoft.com/office/drawing/2010/main"/>
+            </a:ext>
+          </a:extLst>
+        </p:spPr>
+      </p:pic>
+      <p:pic>
+        <p:nvPicPr>
+          <p:cNvPr id="9" name="Imagem 8" descr="C:\Users\joo_c\Desktop\Indexacao-de-Documentos-Clinicos\Indexacao-de-Documentos-Clinicos\Dissertacao\images\eer_model.png"/>
+          <p:cNvPicPr>
+            <a:picLocks noChangeAspect="1"/>
+          </p:cNvPicPr>
+          <p:nvPr/>
+        </p:nvPicPr>
+        <p:blipFill rotWithShape="1">
+          <a:blip r:embed="rId3">
+            <a:extLst>
+              <a:ext uri="{28A0092B-C50C-407E-A947-70E740481C1C}">
+                <a14:useLocalDpi xmlns:a14="http://schemas.microsoft.com/office/drawing/2010/main" val="0"/>
+              </a:ext>
+            </a:extLst>
+          </a:blip>
+          <a:srcRect l="43122" t="52959" r="47357" b="37210"/>
+          <a:stretch/>
+        </p:blipFill>
+        <p:spPr bwMode="auto">
+          <a:xfrm>
+            <a:off x="7708750" y="2085843"/>
+            <a:ext cx="2692550" cy="3302566"/>
+          </a:xfrm>
+          <a:prstGeom prst="rect">
+            <a:avLst/>
+          </a:prstGeom>
+          <a:noFill/>
+          <a:ln>
+            <a:noFill/>
+          </a:ln>
+          <a:extLst>
+            <a:ext uri="{53640926-AAD7-44D8-BBD7-CCE9431645EC}">
+              <a14:shadowObscured xmlns:a14="http://schemas.microsoft.com/office/drawing/2010/main"/>
+            </a:ext>
+          </a:extLst>
+        </p:spPr>
+      </p:pic>
+      <p:sp>
+        <p:nvSpPr>
+          <p:cNvPr id="10" name="Oval 9"/>
+          <p:cNvSpPr/>
+          <p:nvPr/>
+        </p:nvSpPr>
+        <p:spPr>
+          <a:xfrm>
+            <a:off x="10972457" y="875957"/>
+            <a:ext cx="828000" cy="828000"/>
+          </a:xfrm>
+          <a:prstGeom prst="ellipse">
+            <a:avLst/>
+          </a:prstGeom>
+          <a:noFill/>
+          <a:ln w="50800">
+            <a:solidFill>
+              <a:schemeClr val="tx1"/>
+            </a:solidFill>
+          </a:ln>
+        </p:spPr>
+        <p:style>
+          <a:lnRef idx="2">
+            <a:schemeClr val="accent1">
+              <a:shade val="50000"/>
+            </a:schemeClr>
+          </a:lnRef>
+          <a:fillRef idx="1">
+            <a:schemeClr val="accent1"/>
+          </a:fillRef>
+          <a:effectRef idx="0">
+            <a:schemeClr val="accent1"/>
+          </a:effectRef>
+          <a:fontRef idx="minor">
+            <a:schemeClr val="lt1"/>
+          </a:fontRef>
+        </p:style>
+        <p:txBody>
+          <a:bodyPr rtlCol="0" anchor="ctr"/>
+          <a:lstStyle/>
+          <a:p>
+            <a:pPr algn="ctr"/>
+            <a:endParaRPr lang="pt-PT"/>
+          </a:p>
+        </p:txBody>
+      </p:sp>
+    </p:spTree>
+    <p:extLst>
+      <p:ext uri="{BB962C8B-B14F-4D97-AF65-F5344CB8AC3E}">
+        <p14:creationId xmlns:p14="http://schemas.microsoft.com/office/powerpoint/2010/main" val="1630059629"/>
+      </p:ext>
+    </p:extLst>
+  </p:cSld>
+  <p:clrMapOvr>
+    <a:masterClrMapping/>
+  </p:clrMapOvr>
+</p:sld>
+</file>
+
+<file path=ppt/slides/slide13.xml><?xml version="1.0" encoding="utf-8"?>
+<p:sld xmlns:a="http://schemas.openxmlformats.org/drawingml/2006/main" xmlns:r="http://schemas.openxmlformats.org/officeDocument/2006/relationships" xmlns:p="http://schemas.openxmlformats.org/presentationml/2006/main">
+  <p:cSld>
+    <p:spTree>
+      <p:nvGrpSpPr>
+        <p:cNvPr id="1" name=""/>
+        <p:cNvGrpSpPr/>
+        <p:nvPr/>
+      </p:nvGrpSpPr>
+      <p:grpSpPr>
+        <a:xfrm>
+          <a:off x="0" y="0"/>
+          <a:ext cx="0" cy="0"/>
+          <a:chOff x="0" y="0"/>
+          <a:chExt cx="0" cy="0"/>
+        </a:xfrm>
+      </p:grpSpPr>
+      <p:sp>
+        <p:nvSpPr>
+          <p:cNvPr id="6" name="Retângulo 5"/>
+          <p:cNvSpPr/>
+          <p:nvPr/>
+        </p:nvSpPr>
+        <p:spPr>
+          <a:xfrm>
+            <a:off x="10580914" y="604157"/>
+            <a:ext cx="1611086" cy="1371600"/>
+          </a:xfrm>
+          <a:prstGeom prst="rect">
+            <a:avLst/>
+          </a:prstGeom>
+          <a:noFill/>
+          <a:ln>
+            <a:noFill/>
+          </a:ln>
+        </p:spPr>
+        <p:style>
+          <a:lnRef idx="2">
+            <a:schemeClr val="accent1">
+              <a:shade val="50000"/>
+            </a:schemeClr>
+          </a:lnRef>
+          <a:fillRef idx="1">
+            <a:schemeClr val="accent1"/>
+          </a:fillRef>
+          <a:effectRef idx="0">
+            <a:schemeClr val="accent1"/>
+          </a:effectRef>
+          <a:fontRef idx="minor">
+            <a:schemeClr val="lt1"/>
+          </a:fontRef>
+        </p:style>
+        <p:txBody>
+          <a:bodyPr rtlCol="0" anchor="ctr"/>
+          <a:lstStyle/>
+          <a:p>
+            <a:pPr algn="ctr"/>
+            <a:r>
+              <a:rPr lang="en-GB" sz="3200" dirty="0"/>
+              <a:t>1</a:t>
+            </a:r>
+            <a:endParaRPr lang="pt-PT" sz="3200" dirty="0"/>
+          </a:p>
+        </p:txBody>
+      </p:sp>
+      <p:grpSp>
+        <p:nvGrpSpPr>
+          <p:cNvPr id="15" name="Grupo 14"/>
+          <p:cNvGrpSpPr/>
+          <p:nvPr/>
+        </p:nvGrpSpPr>
+        <p:grpSpPr>
+          <a:xfrm>
+            <a:off x="152400" y="933449"/>
+            <a:ext cx="10428514" cy="5303259"/>
+            <a:chOff x="152400" y="933449"/>
+            <a:chExt cx="10428514" cy="5303259"/>
+          </a:xfrm>
+        </p:grpSpPr>
+        <p:pic>
+          <p:nvPicPr>
+            <p:cNvPr id="7" name="Imagem 6" descr="C:\Users\joo_c\Desktop\Indexacao-de-Documentos-Clinicos\Indexacao-de-Documentos-Clinicos\Dissertacao\images\eer_model.png"/>
+            <p:cNvPicPr>
+              <a:picLocks noChangeAspect="1"/>
+            </p:cNvPicPr>
+            <p:nvPr/>
+          </p:nvPicPr>
+          <p:blipFill rotWithShape="1">
+            <a:blip r:embed="rId3">
+              <a:extLst>
+                <a:ext uri="{28A0092B-C50C-407E-A947-70E740481C1C}">
+                  <a14:useLocalDpi xmlns:a14="http://schemas.microsoft.com/office/drawing/2010/main" val="0"/>
+                </a:ext>
+              </a:extLst>
+            </a:blip>
+            <a:srcRect l="4959" t="65176" r="12893" b="-479"/>
+            <a:stretch/>
+          </p:blipFill>
+          <p:spPr bwMode="auto">
+            <a:xfrm>
+              <a:off x="192564" y="933449"/>
+              <a:ext cx="10388350" cy="5303259"/>
+            </a:xfrm>
+            <a:prstGeom prst="rect">
+              <a:avLst/>
+            </a:prstGeom>
+            <a:noFill/>
+            <a:ln>
+              <a:noFill/>
+            </a:ln>
+            <a:extLst>
+              <a:ext uri="{53640926-AAD7-44D8-BBD7-CCE9431645EC}">
+                <a14:shadowObscured xmlns:a14="http://schemas.microsoft.com/office/drawing/2010/main"/>
+              </a:ext>
+            </a:extLst>
+          </p:spPr>
+        </p:pic>
+        <p:grpSp>
+          <p:nvGrpSpPr>
+            <p:cNvPr id="13" name="Grupo 12"/>
+            <p:cNvGrpSpPr/>
+            <p:nvPr/>
+          </p:nvGrpSpPr>
+          <p:grpSpPr>
+            <a:xfrm>
+              <a:off x="152400" y="933450"/>
+              <a:ext cx="10408432" cy="1104900"/>
+              <a:chOff x="152400" y="933450"/>
+              <a:chExt cx="10408432" cy="1104900"/>
+            </a:xfrm>
+          </p:grpSpPr>
+          <p:sp>
+            <p:nvSpPr>
+              <p:cNvPr id="3" name="Retângulo 2"/>
+              <p:cNvSpPr/>
+              <p:nvPr/>
+            </p:nvSpPr>
+            <p:spPr>
+              <a:xfrm>
+                <a:off x="152400" y="933450"/>
+                <a:ext cx="3886200" cy="1042307"/>
+              </a:xfrm>
+              <a:prstGeom prst="rect">
+                <a:avLst/>
+              </a:prstGeom>
+              <a:solidFill>
+                <a:schemeClr val="tx1"/>
+              </a:solidFill>
+              <a:ln>
+                <a:solidFill>
+                  <a:schemeClr val="tx1"/>
+                </a:solidFill>
+              </a:ln>
+            </p:spPr>
+            <p:style>
+              <a:lnRef idx="2">
+                <a:schemeClr val="accent1">
+                  <a:shade val="50000"/>
+                </a:schemeClr>
+              </a:lnRef>
+              <a:fillRef idx="1">
+                <a:schemeClr val="accent1"/>
+              </a:fillRef>
+              <a:effectRef idx="0">
+                <a:schemeClr val="accent1"/>
+              </a:effectRef>
+              <a:fontRef idx="minor">
+                <a:schemeClr val="lt1"/>
+              </a:fontRef>
+            </p:style>
+            <p:txBody>
+              <a:bodyPr rtlCol="0" anchor="ctr"/>
+              <a:lstStyle/>
+              <a:p>
+                <a:pPr algn="ctr"/>
+                <a:endParaRPr lang="pt-PT"/>
+              </a:p>
+            </p:txBody>
+          </p:sp>
+          <p:sp>
+            <p:nvSpPr>
+              <p:cNvPr id="12" name="Retângulo 11"/>
+              <p:cNvSpPr/>
+              <p:nvPr/>
+            </p:nvSpPr>
+            <p:spPr>
+              <a:xfrm>
+                <a:off x="6674632" y="933450"/>
+                <a:ext cx="3886200" cy="1104900"/>
+              </a:xfrm>
+              <a:prstGeom prst="rect">
+                <a:avLst/>
+              </a:prstGeom>
+              <a:solidFill>
+                <a:schemeClr val="tx1"/>
+              </a:solidFill>
+              <a:ln>
+                <a:solidFill>
+                  <a:schemeClr val="tx1"/>
+                </a:solidFill>
+              </a:ln>
+            </p:spPr>
+            <p:style>
+              <a:lnRef idx="2">
+                <a:schemeClr val="accent1">
+                  <a:shade val="50000"/>
+                </a:schemeClr>
+              </a:lnRef>
+              <a:fillRef idx="1">
+                <a:schemeClr val="accent1"/>
+              </a:fillRef>
+              <a:effectRef idx="0">
+                <a:schemeClr val="accent1"/>
+              </a:effectRef>
+              <a:fontRef idx="minor">
+                <a:schemeClr val="lt1"/>
+              </a:fontRef>
+            </p:style>
+            <p:txBody>
+              <a:bodyPr rtlCol="0" anchor="ctr"/>
+              <a:lstStyle/>
+              <a:p>
+                <a:pPr algn="ctr"/>
+                <a:endParaRPr lang="pt-PT"/>
+              </a:p>
+            </p:txBody>
+          </p:sp>
+        </p:grpSp>
+        <p:sp>
+          <p:nvSpPr>
+            <p:cNvPr id="14" name="Retângulo 13"/>
+            <p:cNvSpPr/>
+            <p:nvPr/>
+          </p:nvSpPr>
+          <p:spPr>
+            <a:xfrm>
+              <a:off x="7694182" y="1423307"/>
+              <a:ext cx="1931182" cy="1104900"/>
+            </a:xfrm>
+            <a:prstGeom prst="rect">
+              <a:avLst/>
+            </a:prstGeom>
+            <a:solidFill>
+              <a:schemeClr val="tx1"/>
+            </a:solidFill>
+            <a:ln>
+              <a:solidFill>
+                <a:schemeClr val="tx1"/>
+              </a:solidFill>
+            </a:ln>
+          </p:spPr>
+          <p:style>
+            <a:lnRef idx="2">
+              <a:schemeClr val="accent1">
+                <a:shade val="50000"/>
+              </a:schemeClr>
+            </a:lnRef>
+            <a:fillRef idx="1">
+              <a:schemeClr val="accent1"/>
+            </a:fillRef>
+            <a:effectRef idx="0">
+              <a:schemeClr val="accent1"/>
+            </a:effectRef>
+            <a:fontRef idx="minor">
+              <a:schemeClr val="lt1"/>
+            </a:fontRef>
+          </p:style>
+          <p:txBody>
+            <a:bodyPr rtlCol="0" anchor="ctr"/>
+            <a:lstStyle/>
+            <a:p>
+              <a:pPr algn="ctr"/>
+              <a:endParaRPr lang="pt-PT"/>
+            </a:p>
+          </p:txBody>
+        </p:sp>
+      </p:grpSp>
+      <p:sp>
+        <p:nvSpPr>
+          <p:cNvPr id="16" name="Oval 15"/>
+          <p:cNvSpPr/>
+          <p:nvPr/>
+        </p:nvSpPr>
+        <p:spPr>
+          <a:xfrm>
+            <a:off x="10972457" y="875957"/>
+            <a:ext cx="828000" cy="828000"/>
+          </a:xfrm>
+          <a:prstGeom prst="ellipse">
+            <a:avLst/>
+          </a:prstGeom>
+          <a:noFill/>
+          <a:ln w="50800">
+            <a:solidFill>
+              <a:schemeClr val="tx1"/>
+            </a:solidFill>
+          </a:ln>
+        </p:spPr>
+        <p:style>
+          <a:lnRef idx="2">
+            <a:schemeClr val="accent1">
+              <a:shade val="50000"/>
+            </a:schemeClr>
+          </a:lnRef>
+          <a:fillRef idx="1">
+            <a:schemeClr val="accent1"/>
+          </a:fillRef>
+          <a:effectRef idx="0">
+            <a:schemeClr val="accent1"/>
+          </a:effectRef>
+          <a:fontRef idx="minor">
+            <a:schemeClr val="lt1"/>
+          </a:fontRef>
+        </p:style>
+        <p:txBody>
+          <a:bodyPr rtlCol="0" anchor="ctr"/>
+          <a:lstStyle/>
+          <a:p>
+            <a:pPr algn="ctr"/>
+            <a:endParaRPr lang="pt-PT"/>
+          </a:p>
+        </p:txBody>
+      </p:sp>
+    </p:spTree>
+    <p:extLst>
+      <p:ext uri="{BB962C8B-B14F-4D97-AF65-F5344CB8AC3E}">
+        <p14:creationId xmlns:p14="http://schemas.microsoft.com/office/powerpoint/2010/main" val="1550416118"/>
+      </p:ext>
+    </p:extLst>
+  </p:cSld>
+  <p:clrMapOvr>
+    <a:masterClrMapping/>
+  </p:clrMapOvr>
+</p:sld>
+</file>
+
+<file path=ppt/slides/slide14.xml><?xml version="1.0" encoding="utf-8"?>
 <p:sld xmlns:a="http://schemas.openxmlformats.org/drawingml/2006/main" xmlns:r="http://schemas.openxmlformats.org/officeDocument/2006/relationships" xmlns:p="http://schemas.openxmlformats.org/presentationml/2006/main">
   <p:cSld>
     <p:spTree>
@@ -9218,6 +10140,52 @@
           </a:extLst>
         </p:spPr>
       </p:pic>
+      <p:sp>
+        <p:nvSpPr>
+          <p:cNvPr id="6" name="Oval 5"/>
+          <p:cNvSpPr/>
+          <p:nvPr/>
+        </p:nvSpPr>
+        <p:spPr>
+          <a:xfrm>
+            <a:off x="10972457" y="875957"/>
+            <a:ext cx="828000" cy="828000"/>
+          </a:xfrm>
+          <a:prstGeom prst="ellipse">
+            <a:avLst/>
+          </a:prstGeom>
+          <a:noFill/>
+          <a:ln w="50800">
+            <a:solidFill>
+              <a:schemeClr val="tx1"/>
+            </a:solidFill>
+          </a:ln>
+        </p:spPr>
+        <p:style>
+          <a:lnRef idx="2">
+            <a:schemeClr val="accent1">
+              <a:shade val="50000"/>
+            </a:schemeClr>
+          </a:lnRef>
+          <a:fillRef idx="1">
+            <a:schemeClr val="accent1"/>
+          </a:fillRef>
+          <a:effectRef idx="0">
+            <a:schemeClr val="accent1"/>
+          </a:effectRef>
+          <a:fontRef idx="minor">
+            <a:schemeClr val="lt1"/>
+          </a:fontRef>
+        </p:style>
+        <p:txBody>
+          <a:bodyPr rtlCol="0" anchor="ctr"/>
+          <a:lstStyle/>
+          <a:p>
+            <a:pPr algn="ctr"/>
+            <a:endParaRPr lang="pt-PT"/>
+          </a:p>
+        </p:txBody>
+      </p:sp>
     </p:spTree>
     <p:extLst>
       <p:ext uri="{BB962C8B-B14F-4D97-AF65-F5344CB8AC3E}">
@@ -9231,7 +10199,7 @@
 </p:sld>
 </file>
 
-<file path=ppt/slides/slide13.xml><?xml version="1.0" encoding="utf-8"?>
+<file path=ppt/slides/slide15.xml><?xml version="1.0" encoding="utf-8"?>
 <p:sld xmlns:a="http://schemas.openxmlformats.org/drawingml/2006/main" xmlns:r="http://schemas.openxmlformats.org/officeDocument/2006/relationships" xmlns:p="http://schemas.openxmlformats.org/presentationml/2006/main">
   <p:cSld>
     <p:spTree>
@@ -9292,16 +10260,6 @@
                 <a:schemeClr val="bg1"/>
               </a:solidFill>
             </a:endParaRPr>
-          </a:p>
-          <a:p>
-            <a:r>
-              <a:rPr lang="en-GB" dirty="0">
-                <a:solidFill>
-                  <a:schemeClr val="bg1"/>
-                </a:solidFill>
-              </a:rPr>
-              <a:t>data-config.xml</a:t>
-            </a:r>
           </a:p>
           <a:p>
             <a:endParaRPr lang="en-GB" dirty="0">
@@ -9392,6 +10350,52 @@
           </a:p>
         </p:txBody>
       </p:sp>
+      <p:sp>
+        <p:nvSpPr>
+          <p:cNvPr id="5" name="Oval 4"/>
+          <p:cNvSpPr/>
+          <p:nvPr/>
+        </p:nvSpPr>
+        <p:spPr>
+          <a:xfrm>
+            <a:off x="10972457" y="875957"/>
+            <a:ext cx="828000" cy="828000"/>
+          </a:xfrm>
+          <a:prstGeom prst="ellipse">
+            <a:avLst/>
+          </a:prstGeom>
+          <a:noFill/>
+          <a:ln w="50800">
+            <a:solidFill>
+              <a:schemeClr val="tx1"/>
+            </a:solidFill>
+          </a:ln>
+        </p:spPr>
+        <p:style>
+          <a:lnRef idx="2">
+            <a:schemeClr val="accent1">
+              <a:shade val="50000"/>
+            </a:schemeClr>
+          </a:lnRef>
+          <a:fillRef idx="1">
+            <a:schemeClr val="accent1"/>
+          </a:fillRef>
+          <a:effectRef idx="0">
+            <a:schemeClr val="accent1"/>
+          </a:effectRef>
+          <a:fontRef idx="minor">
+            <a:schemeClr val="lt1"/>
+          </a:fontRef>
+        </p:style>
+        <p:txBody>
+          <a:bodyPr rtlCol="0" anchor="ctr"/>
+          <a:lstStyle/>
+          <a:p>
+            <a:pPr algn="ctr"/>
+            <a:endParaRPr lang="pt-PT"/>
+          </a:p>
+        </p:txBody>
+      </p:sp>
     </p:spTree>
     <p:extLst>
       <p:ext uri="{BB962C8B-B14F-4D97-AF65-F5344CB8AC3E}">
@@ -9405,7 +10409,7 @@
 </p:sld>
 </file>
 
-<file path=ppt/slides/slide14.xml><?xml version="1.0" encoding="utf-8"?>
+<file path=ppt/slides/slide16.xml><?xml version="1.0" encoding="utf-8"?>
 <p:sld xmlns:a="http://schemas.openxmlformats.org/drawingml/2006/main" xmlns:r="http://schemas.openxmlformats.org/officeDocument/2006/relationships" xmlns:p="http://schemas.openxmlformats.org/presentationml/2006/main">
   <p:cSld>
     <p:spTree>
@@ -9460,7 +10464,7 @@
         <p:spPr>
           <a:xfrm>
             <a:off x="680321" y="2336872"/>
-            <a:ext cx="9613861" cy="4112913"/>
+            <a:ext cx="9613861" cy="4521128"/>
           </a:xfrm>
         </p:spPr>
         <p:txBody>
@@ -11466,6 +12470,233 @@
                 <a:latin typeface="Courier New" panose="02070309020205020404" pitchFamily="49" charset="0"/>
               </a:rPr>
               <a:t>"true"</a:t>
+            </a:r>
+            <a:r>
+              <a:rPr lang="en-US" dirty="0">
+                <a:solidFill>
+                  <a:srgbClr val="0000FF"/>
+                </a:solidFill>
+                <a:latin typeface="Courier New" panose="02070309020205020404" pitchFamily="49" charset="0"/>
+              </a:rPr>
+              <a:t>/&gt;</a:t>
+            </a:r>
+          </a:p>
+          <a:p>
+            <a:r>
+              <a:rPr lang="en-US" dirty="0">
+                <a:solidFill>
+                  <a:srgbClr val="0000FF"/>
+                </a:solidFill>
+                <a:latin typeface="Courier New" panose="02070309020205020404" pitchFamily="49" charset="0"/>
+              </a:rPr>
+              <a:t>&lt;field</a:t>
+            </a:r>
+            <a:r>
+              <a:rPr lang="en-US" dirty="0">
+                <a:solidFill>
+                  <a:srgbClr val="000000"/>
+                </a:solidFill>
+                <a:latin typeface="Courier New" panose="02070309020205020404" pitchFamily="49" charset="0"/>
+              </a:rPr>
+              <a:t> </a:t>
+            </a:r>
+            <a:r>
+              <a:rPr lang="en-US" dirty="0">
+                <a:solidFill>
+                  <a:srgbClr val="FF0000"/>
+                </a:solidFill>
+                <a:latin typeface="Courier New" panose="02070309020205020404" pitchFamily="49" charset="0"/>
+              </a:rPr>
+              <a:t>name</a:t>
+            </a:r>
+            <a:r>
+              <a:rPr lang="en-US" dirty="0">
+                <a:solidFill>
+                  <a:srgbClr val="000000"/>
+                </a:solidFill>
+                <a:latin typeface="Courier New" panose="02070309020205020404" pitchFamily="49" charset="0"/>
+              </a:rPr>
+              <a:t>=</a:t>
+            </a:r>
+            <a:r>
+              <a:rPr lang="en-US" b="1" dirty="0">
+                <a:solidFill>
+                  <a:srgbClr val="8000FF"/>
+                </a:solidFill>
+                <a:latin typeface="Courier New" panose="02070309020205020404" pitchFamily="49" charset="0"/>
+              </a:rPr>
+              <a:t>"text"</a:t>
+            </a:r>
+            <a:r>
+              <a:rPr lang="en-US" dirty="0">
+                <a:solidFill>
+                  <a:srgbClr val="000000"/>
+                </a:solidFill>
+                <a:latin typeface="Courier New" panose="02070309020205020404" pitchFamily="49" charset="0"/>
+              </a:rPr>
+              <a:t> </a:t>
+            </a:r>
+            <a:r>
+              <a:rPr lang="en-US" dirty="0">
+                <a:solidFill>
+                  <a:srgbClr val="FF0000"/>
+                </a:solidFill>
+                <a:latin typeface="Courier New" panose="02070309020205020404" pitchFamily="49" charset="0"/>
+              </a:rPr>
+              <a:t>type</a:t>
+            </a:r>
+            <a:r>
+              <a:rPr lang="en-US" dirty="0">
+                <a:solidFill>
+                  <a:srgbClr val="000000"/>
+                </a:solidFill>
+                <a:latin typeface="Courier New" panose="02070309020205020404" pitchFamily="49" charset="0"/>
+              </a:rPr>
+              <a:t>=</a:t>
+            </a:r>
+            <a:r>
+              <a:rPr lang="en-US" b="1" dirty="0">
+                <a:solidFill>
+                  <a:srgbClr val="8000FF"/>
+                </a:solidFill>
+                <a:latin typeface="Courier New" panose="02070309020205020404" pitchFamily="49" charset="0"/>
+              </a:rPr>
+              <a:t>"</a:t>
+            </a:r>
+            <a:r>
+              <a:rPr lang="en-US" b="1" dirty="0" err="1">
+                <a:solidFill>
+                  <a:srgbClr val="8000FF"/>
+                </a:solidFill>
+                <a:latin typeface="Courier New" panose="02070309020205020404" pitchFamily="49" charset="0"/>
+              </a:rPr>
+              <a:t>text_general</a:t>
+            </a:r>
+            <a:r>
+              <a:rPr lang="en-US" b="1" dirty="0">
+                <a:solidFill>
+                  <a:srgbClr val="8000FF"/>
+                </a:solidFill>
+                <a:latin typeface="Courier New" panose="02070309020205020404" pitchFamily="49" charset="0"/>
+              </a:rPr>
+              <a:t>"</a:t>
+            </a:r>
+            <a:r>
+              <a:rPr lang="en-US" dirty="0">
+                <a:solidFill>
+                  <a:srgbClr val="000000"/>
+                </a:solidFill>
+                <a:latin typeface="Courier New" panose="02070309020205020404" pitchFamily="49" charset="0"/>
+              </a:rPr>
+              <a:t> </a:t>
+            </a:r>
+            <a:r>
+              <a:rPr lang="en-US" dirty="0">
+                <a:solidFill>
+                  <a:srgbClr val="FF0000"/>
+                </a:solidFill>
+                <a:latin typeface="Courier New" panose="02070309020205020404" pitchFamily="49" charset="0"/>
+              </a:rPr>
+              <a:t>indexed</a:t>
+            </a:r>
+            <a:r>
+              <a:rPr lang="en-US" dirty="0">
+                <a:solidFill>
+                  <a:srgbClr val="000000"/>
+                </a:solidFill>
+                <a:latin typeface="Courier New" panose="02070309020205020404" pitchFamily="49" charset="0"/>
+              </a:rPr>
+              <a:t>=</a:t>
+            </a:r>
+            <a:r>
+              <a:rPr lang="en-US" b="1" dirty="0">
+                <a:solidFill>
+                  <a:srgbClr val="8000FF"/>
+                </a:solidFill>
+                <a:latin typeface="Courier New" panose="02070309020205020404" pitchFamily="49" charset="0"/>
+              </a:rPr>
+              <a:t>"true"</a:t>
+            </a:r>
+            <a:r>
+              <a:rPr lang="en-US" dirty="0">
+                <a:solidFill>
+                  <a:srgbClr val="000000"/>
+                </a:solidFill>
+                <a:latin typeface="Courier New" panose="02070309020205020404" pitchFamily="49" charset="0"/>
+              </a:rPr>
+              <a:t> </a:t>
+            </a:r>
+            <a:r>
+              <a:rPr lang="en-US" dirty="0">
+                <a:solidFill>
+                  <a:srgbClr val="FF0000"/>
+                </a:solidFill>
+                <a:latin typeface="Courier New" panose="02070309020205020404" pitchFamily="49" charset="0"/>
+              </a:rPr>
+              <a:t>stored</a:t>
+            </a:r>
+            <a:r>
+              <a:rPr lang="en-US" dirty="0">
+                <a:solidFill>
+                  <a:srgbClr val="000000"/>
+                </a:solidFill>
+                <a:latin typeface="Courier New" panose="02070309020205020404" pitchFamily="49" charset="0"/>
+              </a:rPr>
+              <a:t>=</a:t>
+            </a:r>
+            <a:r>
+              <a:rPr lang="en-US" b="1" dirty="0">
+                <a:solidFill>
+                  <a:srgbClr val="8000FF"/>
+                </a:solidFill>
+                <a:latin typeface="Courier New" panose="02070309020205020404" pitchFamily="49" charset="0"/>
+              </a:rPr>
+              <a:t>"false"</a:t>
+            </a:r>
+            <a:r>
+              <a:rPr lang="en-US" dirty="0">
+                <a:solidFill>
+                  <a:srgbClr val="000000"/>
+                </a:solidFill>
+                <a:latin typeface="Courier New" panose="02070309020205020404" pitchFamily="49" charset="0"/>
+              </a:rPr>
+              <a:t> </a:t>
+            </a:r>
+            <a:r>
+              <a:rPr lang="en-US" dirty="0" err="1">
+                <a:solidFill>
+                  <a:srgbClr val="FF0000"/>
+                </a:solidFill>
+                <a:latin typeface="Courier New" panose="02070309020205020404" pitchFamily="49" charset="0"/>
+              </a:rPr>
+              <a:t>multiValued</a:t>
+            </a:r>
+            <a:r>
+              <a:rPr lang="en-US" dirty="0">
+                <a:solidFill>
+                  <a:srgbClr val="000000"/>
+                </a:solidFill>
+                <a:latin typeface="Courier New" panose="02070309020205020404" pitchFamily="49" charset="0"/>
+              </a:rPr>
+              <a:t>=</a:t>
+            </a:r>
+            <a:r>
+              <a:rPr lang="en-US" b="1" dirty="0">
+                <a:solidFill>
+                  <a:srgbClr val="8000FF"/>
+                </a:solidFill>
+                <a:latin typeface="Courier New" panose="02070309020205020404" pitchFamily="49" charset="0"/>
+              </a:rPr>
+              <a:t>"true"</a:t>
+            </a:r>
+            <a:r>
+              <a:rPr lang="en-US" dirty="0">
+                <a:solidFill>
+                  <a:srgbClr val="000000"/>
+                </a:solidFill>
+                <a:latin typeface="Courier New" panose="02070309020205020404" pitchFamily="49" charset="0"/>
+              </a:rPr>
+              <a:t> </a:t>
             </a:r>
             <a:r>
               <a:rPr lang="en-US" dirty="0">
@@ -11528,6 +12759,52 @@
           </a:p>
         </p:txBody>
       </p:sp>
+      <p:sp>
+        <p:nvSpPr>
+          <p:cNvPr id="5" name="Oval 4"/>
+          <p:cNvSpPr/>
+          <p:nvPr/>
+        </p:nvSpPr>
+        <p:spPr>
+          <a:xfrm>
+            <a:off x="10972457" y="875957"/>
+            <a:ext cx="828000" cy="828000"/>
+          </a:xfrm>
+          <a:prstGeom prst="ellipse">
+            <a:avLst/>
+          </a:prstGeom>
+          <a:noFill/>
+          <a:ln w="50800">
+            <a:solidFill>
+              <a:schemeClr val="tx1"/>
+            </a:solidFill>
+          </a:ln>
+        </p:spPr>
+        <p:style>
+          <a:lnRef idx="2">
+            <a:schemeClr val="accent1">
+              <a:shade val="50000"/>
+            </a:schemeClr>
+          </a:lnRef>
+          <a:fillRef idx="1">
+            <a:schemeClr val="accent1"/>
+          </a:fillRef>
+          <a:effectRef idx="0">
+            <a:schemeClr val="accent1"/>
+          </a:effectRef>
+          <a:fontRef idx="minor">
+            <a:schemeClr val="lt1"/>
+          </a:fontRef>
+        </p:style>
+        <p:txBody>
+          <a:bodyPr rtlCol="0" anchor="ctr"/>
+          <a:lstStyle/>
+          <a:p>
+            <a:pPr algn="ctr"/>
+            <a:endParaRPr lang="pt-PT"/>
+          </a:p>
+        </p:txBody>
+      </p:sp>
     </p:spTree>
     <p:extLst>
       <p:ext uri="{BB962C8B-B14F-4D97-AF65-F5344CB8AC3E}">
@@ -11541,7 +12818,7 @@
 </p:sld>
 </file>
 
-<file path=ppt/slides/slide15.xml><?xml version="1.0" encoding="utf-8"?>
+<file path=ppt/slides/slide17.xml><?xml version="1.0" encoding="utf-8"?>
 <p:sld xmlns:a="http://schemas.openxmlformats.org/drawingml/2006/main" xmlns:r="http://schemas.openxmlformats.org/officeDocument/2006/relationships" xmlns:p="http://schemas.openxmlformats.org/presentationml/2006/main">
   <p:cSld>
     <p:spTree>
@@ -12500,6 +13777,52 @@
           </a:p>
         </p:txBody>
       </p:sp>
+      <p:sp>
+        <p:nvSpPr>
+          <p:cNvPr id="5" name="Oval 4"/>
+          <p:cNvSpPr/>
+          <p:nvPr/>
+        </p:nvSpPr>
+        <p:spPr>
+          <a:xfrm>
+            <a:off x="10972457" y="875957"/>
+            <a:ext cx="828000" cy="828000"/>
+          </a:xfrm>
+          <a:prstGeom prst="ellipse">
+            <a:avLst/>
+          </a:prstGeom>
+          <a:noFill/>
+          <a:ln w="50800">
+            <a:solidFill>
+              <a:schemeClr val="tx1"/>
+            </a:solidFill>
+          </a:ln>
+        </p:spPr>
+        <p:style>
+          <a:lnRef idx="2">
+            <a:schemeClr val="accent1">
+              <a:shade val="50000"/>
+            </a:schemeClr>
+          </a:lnRef>
+          <a:fillRef idx="1">
+            <a:schemeClr val="accent1"/>
+          </a:fillRef>
+          <a:effectRef idx="0">
+            <a:schemeClr val="accent1"/>
+          </a:effectRef>
+          <a:fontRef idx="minor">
+            <a:schemeClr val="lt1"/>
+          </a:fontRef>
+        </p:style>
+        <p:txBody>
+          <a:bodyPr rtlCol="0" anchor="ctr"/>
+          <a:lstStyle/>
+          <a:p>
+            <a:pPr algn="ctr"/>
+            <a:endParaRPr lang="pt-PT"/>
+          </a:p>
+        </p:txBody>
+      </p:sp>
     </p:spTree>
     <p:extLst>
       <p:ext uri="{BB962C8B-B14F-4D97-AF65-F5344CB8AC3E}">
@@ -12513,7 +13836,7 @@
 </p:sld>
 </file>
 
-<file path=ppt/slides/slide16.xml><?xml version="1.0" encoding="utf-8"?>
+<file path=ppt/slides/slide18.xml><?xml version="1.0" encoding="utf-8"?>
 <p:sld xmlns:a="http://schemas.openxmlformats.org/drawingml/2006/main" xmlns:r="http://schemas.openxmlformats.org/officeDocument/2006/relationships" xmlns:p="http://schemas.openxmlformats.org/presentationml/2006/main">
   <p:cSld>
     <p:spTree>
@@ -12567,6 +13890,82 @@
           <a:bodyPr/>
           <a:lstStyle/>
           <a:p>
+            <a:endParaRPr lang="en-GB" dirty="0">
+              <a:solidFill>
+                <a:schemeClr val="bg1"/>
+              </a:solidFill>
+            </a:endParaRPr>
+          </a:p>
+          <a:p>
+            <a:endParaRPr lang="en-GB" dirty="0">
+              <a:solidFill>
+                <a:schemeClr val="bg1"/>
+              </a:solidFill>
+            </a:endParaRPr>
+          </a:p>
+          <a:p>
+            <a:r>
+              <a:rPr lang="en-GB" dirty="0" err="1">
+                <a:solidFill>
+                  <a:schemeClr val="bg1"/>
+                </a:solidFill>
+              </a:rPr>
+              <a:t>Modelo</a:t>
+            </a:r>
+            <a:r>
+              <a:rPr lang="en-GB" dirty="0">
+                <a:solidFill>
+                  <a:schemeClr val="bg1"/>
+                </a:solidFill>
+              </a:rPr>
+              <a:t> </a:t>
+            </a:r>
+            <a:r>
+              <a:rPr lang="en-GB" dirty="0" err="1">
+                <a:solidFill>
+                  <a:schemeClr val="bg1"/>
+                </a:solidFill>
+              </a:rPr>
+              <a:t>Vetorial</a:t>
+            </a:r>
+            <a:endParaRPr lang="en-GB" dirty="0">
+              <a:solidFill>
+                <a:schemeClr val="bg1"/>
+              </a:solidFill>
+            </a:endParaRPr>
+          </a:p>
+          <a:p>
+            <a:endParaRPr lang="en-GB" dirty="0">
+              <a:solidFill>
+                <a:schemeClr val="bg1"/>
+              </a:solidFill>
+            </a:endParaRPr>
+          </a:p>
+          <a:p>
+            <a:r>
+              <a:rPr lang="en-GB" dirty="0" err="1">
+                <a:solidFill>
+                  <a:schemeClr val="bg1"/>
+                </a:solidFill>
+              </a:rPr>
+              <a:t>Modelo</a:t>
+            </a:r>
+            <a:r>
+              <a:rPr lang="en-GB" dirty="0">
+                <a:solidFill>
+                  <a:schemeClr val="bg1"/>
+                </a:solidFill>
+              </a:rPr>
+              <a:t> </a:t>
+            </a:r>
+            <a:r>
+              <a:rPr lang="en-GB" dirty="0" err="1">
+                <a:solidFill>
+                  <a:schemeClr val="bg1"/>
+                </a:solidFill>
+              </a:rPr>
+              <a:t>Booleano</a:t>
+            </a:r>
             <a:endParaRPr lang="pt-PT" dirty="0">
               <a:solidFill>
                 <a:schemeClr val="bg1"/>
@@ -12623,6 +14022,52 @@
           </a:p>
         </p:txBody>
       </p:sp>
+      <p:sp>
+        <p:nvSpPr>
+          <p:cNvPr id="5" name="Oval 4"/>
+          <p:cNvSpPr/>
+          <p:nvPr/>
+        </p:nvSpPr>
+        <p:spPr>
+          <a:xfrm>
+            <a:off x="10972457" y="875957"/>
+            <a:ext cx="828000" cy="828000"/>
+          </a:xfrm>
+          <a:prstGeom prst="ellipse">
+            <a:avLst/>
+          </a:prstGeom>
+          <a:noFill/>
+          <a:ln w="50800">
+            <a:solidFill>
+              <a:schemeClr val="tx1"/>
+            </a:solidFill>
+          </a:ln>
+        </p:spPr>
+        <p:style>
+          <a:lnRef idx="2">
+            <a:schemeClr val="accent1">
+              <a:shade val="50000"/>
+            </a:schemeClr>
+          </a:lnRef>
+          <a:fillRef idx="1">
+            <a:schemeClr val="accent1"/>
+          </a:fillRef>
+          <a:effectRef idx="0">
+            <a:schemeClr val="accent1"/>
+          </a:effectRef>
+          <a:fontRef idx="minor">
+            <a:schemeClr val="lt1"/>
+          </a:fontRef>
+        </p:style>
+        <p:txBody>
+          <a:bodyPr rtlCol="0" anchor="ctr"/>
+          <a:lstStyle/>
+          <a:p>
+            <a:pPr algn="ctr"/>
+            <a:endParaRPr lang="pt-PT"/>
+          </a:p>
+        </p:txBody>
+      </p:sp>
     </p:spTree>
     <p:extLst>
       <p:ext uri="{BB962C8B-B14F-4D97-AF65-F5344CB8AC3E}">
@@ -12636,75 +14081,7 @@
 </p:sld>
 </file>
 
-<file path=ppt/slides/slide17.xml><?xml version="1.0" encoding="utf-8"?>
-<p:sld xmlns:a="http://schemas.openxmlformats.org/drawingml/2006/main" xmlns:r="http://schemas.openxmlformats.org/officeDocument/2006/relationships" xmlns:p="http://schemas.openxmlformats.org/presentationml/2006/main">
-  <p:cSld>
-    <p:spTree>
-      <p:nvGrpSpPr>
-        <p:cNvPr id="1" name=""/>
-        <p:cNvGrpSpPr/>
-        <p:nvPr/>
-      </p:nvGrpSpPr>
-      <p:grpSpPr>
-        <a:xfrm>
-          <a:off x="0" y="0"/>
-          <a:ext cx="0" cy="0"/>
-          <a:chOff x="0" y="0"/>
-          <a:chExt cx="0" cy="0"/>
-        </a:xfrm>
-      </p:grpSpPr>
-      <p:sp>
-        <p:nvSpPr>
-          <p:cNvPr id="2" name="Título 1"/>
-          <p:cNvSpPr>
-            <a:spLocks noGrp="1"/>
-          </p:cNvSpPr>
-          <p:nvPr>
-            <p:ph type="title"/>
-          </p:nvPr>
-        </p:nvSpPr>
-        <p:spPr/>
-        <p:txBody>
-          <a:bodyPr/>
-          <a:lstStyle/>
-          <a:p>
-            <a:endParaRPr lang="pt-PT"/>
-          </a:p>
-        </p:txBody>
-      </p:sp>
-      <p:sp>
-        <p:nvSpPr>
-          <p:cNvPr id="3" name="Marcador de Posição de Conteúdo 2"/>
-          <p:cNvSpPr>
-            <a:spLocks noGrp="1"/>
-          </p:cNvSpPr>
-          <p:nvPr>
-            <p:ph idx="1"/>
-          </p:nvPr>
-        </p:nvSpPr>
-        <p:spPr/>
-        <p:txBody>
-          <a:bodyPr/>
-          <a:lstStyle/>
-          <a:p>
-            <a:endParaRPr lang="pt-PT"/>
-          </a:p>
-        </p:txBody>
-      </p:sp>
-    </p:spTree>
-    <p:extLst>
-      <p:ext uri="{BB962C8B-B14F-4D97-AF65-F5344CB8AC3E}">
-        <p14:creationId xmlns:p14="http://schemas.microsoft.com/office/powerpoint/2010/main" val="974071177"/>
-      </p:ext>
-    </p:extLst>
-  </p:cSld>
-  <p:clrMapOvr>
-    <a:masterClrMapping/>
-  </p:clrMapOvr>
-</p:sld>
-</file>
-
-<file path=ppt/slides/slide18.xml><?xml version="1.0" encoding="utf-8"?>
+<file path=ppt/slides/slide19.xml><?xml version="1.0" encoding="utf-8"?>
 <p:sld xmlns:a="http://schemas.openxmlformats.org/drawingml/2006/main" xmlns:r="http://schemas.openxmlformats.org/officeDocument/2006/relationships" xmlns:p="http://schemas.openxmlformats.org/presentationml/2006/main">
   <p:cSld>
     <p:spTree>
@@ -12769,7 +14146,185 @@
 </p:sld>
 </file>
 
-<file path=ppt/slides/slide19.xml><?xml version="1.0" encoding="utf-8"?>
+<file path=ppt/slides/slide2.xml><?xml version="1.0" encoding="utf-8"?>
+<p:sld xmlns:a="http://schemas.openxmlformats.org/drawingml/2006/main" xmlns:r="http://schemas.openxmlformats.org/officeDocument/2006/relationships" xmlns:p="http://schemas.openxmlformats.org/presentationml/2006/main">
+  <p:cSld>
+    <p:spTree>
+      <p:nvGrpSpPr>
+        <p:cNvPr id="1" name=""/>
+        <p:cNvGrpSpPr/>
+        <p:nvPr/>
+      </p:nvGrpSpPr>
+      <p:grpSpPr>
+        <a:xfrm>
+          <a:off x="0" y="0"/>
+          <a:ext cx="0" cy="0"/>
+          <a:chOff x="0" y="0"/>
+          <a:chExt cx="0" cy="0"/>
+        </a:xfrm>
+      </p:grpSpPr>
+      <p:sp>
+        <p:nvSpPr>
+          <p:cNvPr id="2" name="Título 1"/>
+          <p:cNvSpPr>
+            <a:spLocks noGrp="1"/>
+          </p:cNvSpPr>
+          <p:nvPr>
+            <p:ph type="title"/>
+          </p:nvPr>
+        </p:nvSpPr>
+        <p:spPr/>
+        <p:txBody>
+          <a:bodyPr/>
+          <a:lstStyle/>
+          <a:p>
+            <a:r>
+              <a:rPr lang="pt-PT" dirty="0"/>
+              <a:t>Contexto</a:t>
+            </a:r>
+          </a:p>
+        </p:txBody>
+      </p:sp>
+      <p:sp>
+        <p:nvSpPr>
+          <p:cNvPr id="3" name="Marcador de Posição de Conteúdo 2"/>
+          <p:cNvSpPr>
+            <a:spLocks noGrp="1"/>
+          </p:cNvSpPr>
+          <p:nvPr>
+            <p:ph idx="1"/>
+          </p:nvPr>
+        </p:nvSpPr>
+        <p:spPr/>
+        <p:txBody>
+          <a:bodyPr>
+            <a:normAutofit/>
+          </a:bodyPr>
+          <a:lstStyle/>
+          <a:p>
+            <a:endParaRPr lang="pt-PT" dirty="0">
+              <a:solidFill>
+                <a:schemeClr val="bg1"/>
+              </a:solidFill>
+            </a:endParaRPr>
+          </a:p>
+          <a:p>
+            <a:r>
+              <a:rPr lang="pt-PT" dirty="0">
+                <a:solidFill>
+                  <a:schemeClr val="bg1"/>
+                </a:solidFill>
+              </a:rPr>
+              <a:t>Numa perspetiva clínica</a:t>
+            </a:r>
+            <a:r>
+              <a:rPr lang="en-GB" dirty="0">
+                <a:solidFill>
+                  <a:schemeClr val="bg1"/>
+                </a:solidFill>
+              </a:rPr>
+              <a:t>: </a:t>
+            </a:r>
+            <a:endParaRPr lang="pt-PT" dirty="0">
+              <a:solidFill>
+                <a:schemeClr val="bg1"/>
+              </a:solidFill>
+            </a:endParaRPr>
+          </a:p>
+          <a:p>
+            <a:pPr lvl="1"/>
+            <a:r>
+              <a:rPr lang="pt-PT" dirty="0">
+                <a:solidFill>
+                  <a:schemeClr val="bg1"/>
+                </a:solidFill>
+              </a:rPr>
+              <a:t>Existe muita informação, muitos dados</a:t>
+            </a:r>
+          </a:p>
+          <a:p>
+            <a:pPr lvl="2"/>
+            <a:r>
+              <a:rPr lang="pt-PT" dirty="0">
+                <a:solidFill>
+                  <a:schemeClr val="bg1"/>
+                </a:solidFill>
+              </a:rPr>
+              <a:t>Em documentos não estruturados </a:t>
+            </a:r>
+          </a:p>
+          <a:p>
+            <a:pPr lvl="2"/>
+            <a:r>
+              <a:rPr lang="pt-PT" dirty="0">
+                <a:solidFill>
+                  <a:schemeClr val="bg1"/>
+                </a:solidFill>
+              </a:rPr>
+              <a:t>e estruturados em bases de dados</a:t>
+            </a:r>
+          </a:p>
+          <a:p>
+            <a:pPr lvl="1"/>
+            <a:endParaRPr lang="pt-PT" dirty="0">
+              <a:solidFill>
+                <a:schemeClr val="bg1"/>
+              </a:solidFill>
+            </a:endParaRPr>
+          </a:p>
+          <a:p>
+            <a:pPr lvl="1"/>
+            <a:r>
+              <a:rPr lang="pt-PT" dirty="0">
+                <a:solidFill>
+                  <a:schemeClr val="bg1"/>
+                </a:solidFill>
+              </a:rPr>
+              <a:t>É necessário organizar e melhorar o acesso integrado da informação</a:t>
+            </a:r>
+          </a:p>
+          <a:p>
+            <a:pPr lvl="1"/>
+            <a:endParaRPr lang="pt-PT" dirty="0">
+              <a:solidFill>
+                <a:schemeClr val="bg1"/>
+              </a:solidFill>
+            </a:endParaRPr>
+          </a:p>
+          <a:p>
+            <a:pPr lvl="1"/>
+            <a:r>
+              <a:rPr lang="pt-PT" dirty="0">
+                <a:solidFill>
+                  <a:schemeClr val="bg1"/>
+                </a:solidFill>
+              </a:rPr>
+              <a:t>Surgem ferramentas indexação e pesquisa de informação</a:t>
+            </a:r>
+          </a:p>
+          <a:p>
+            <a:endParaRPr lang="pt-PT" dirty="0">
+              <a:solidFill>
+                <a:schemeClr val="bg1"/>
+              </a:solidFill>
+            </a:endParaRPr>
+          </a:p>
+        </p:txBody>
+      </p:sp>
+    </p:spTree>
+    <p:extLst>
+      <p:ext uri="{BB962C8B-B14F-4D97-AF65-F5344CB8AC3E}">
+        <p14:creationId xmlns:p14="http://schemas.microsoft.com/office/powerpoint/2010/main" val="373284507"/>
+      </p:ext>
+    </p:extLst>
+  </p:cSld>
+  <p:clrMapOvr>
+    <a:masterClrMapping/>
+  </p:clrMapOvr>
+</p:sld>
+</file>
+
+<file path=ppt/slides/slide20.xml><?xml version="1.0" encoding="utf-8"?>
 <p:sld xmlns:a="http://schemas.openxmlformats.org/drawingml/2006/main" xmlns:r="http://schemas.openxmlformats.org/officeDocument/2006/relationships" xmlns:p="http://schemas.openxmlformats.org/presentationml/2006/main">
   <p:cSld>
     <p:spTree>
@@ -12834,250 +14389,6 @@
 </p:sld>
 </file>
 
-<file path=ppt/slides/slide2.xml><?xml version="1.0" encoding="utf-8"?>
-<p:sld xmlns:a="http://schemas.openxmlformats.org/drawingml/2006/main" xmlns:r="http://schemas.openxmlformats.org/officeDocument/2006/relationships" xmlns:p="http://schemas.openxmlformats.org/presentationml/2006/main">
-  <p:cSld>
-    <p:spTree>
-      <p:nvGrpSpPr>
-        <p:cNvPr id="1" name=""/>
-        <p:cNvGrpSpPr/>
-        <p:nvPr/>
-      </p:nvGrpSpPr>
-      <p:grpSpPr>
-        <a:xfrm>
-          <a:off x="0" y="0"/>
-          <a:ext cx="0" cy="0"/>
-          <a:chOff x="0" y="0"/>
-          <a:chExt cx="0" cy="0"/>
-        </a:xfrm>
-      </p:grpSpPr>
-      <p:sp>
-        <p:nvSpPr>
-          <p:cNvPr id="2" name="Título 1"/>
-          <p:cNvSpPr>
-            <a:spLocks noGrp="1"/>
-          </p:cNvSpPr>
-          <p:nvPr>
-            <p:ph type="title"/>
-          </p:nvPr>
-        </p:nvSpPr>
-        <p:spPr/>
-        <p:txBody>
-          <a:bodyPr/>
-          <a:lstStyle/>
-          <a:p>
-            <a:r>
-              <a:rPr lang="pt-PT" dirty="0"/>
-              <a:t>Contexto</a:t>
-            </a:r>
-          </a:p>
-        </p:txBody>
-      </p:sp>
-      <p:sp>
-        <p:nvSpPr>
-          <p:cNvPr id="3" name="Marcador de Posição de Conteúdo 2"/>
-          <p:cNvSpPr>
-            <a:spLocks noGrp="1"/>
-          </p:cNvSpPr>
-          <p:nvPr>
-            <p:ph idx="1"/>
-          </p:nvPr>
-        </p:nvSpPr>
-        <p:spPr/>
-        <p:txBody>
-          <a:bodyPr>
-            <a:normAutofit/>
-          </a:bodyPr>
-          <a:lstStyle/>
-          <a:p>
-            <a:endParaRPr lang="pt-PT" dirty="0">
-              <a:solidFill>
-                <a:schemeClr val="bg1"/>
-              </a:solidFill>
-            </a:endParaRPr>
-          </a:p>
-          <a:p>
-            <a:r>
-              <a:rPr lang="pt-PT" dirty="0">
-                <a:solidFill>
-                  <a:schemeClr val="bg1"/>
-                </a:solidFill>
-              </a:rPr>
-              <a:t>Numa perspetiva clínica</a:t>
-            </a:r>
-            <a:r>
-              <a:rPr lang="en-GB" dirty="0">
-                <a:solidFill>
-                  <a:schemeClr val="bg1"/>
-                </a:solidFill>
-              </a:rPr>
-              <a:t>: </a:t>
-            </a:r>
-            <a:endParaRPr lang="pt-PT" dirty="0">
-              <a:solidFill>
-                <a:schemeClr val="bg1"/>
-              </a:solidFill>
-            </a:endParaRPr>
-          </a:p>
-          <a:p>
-            <a:pPr lvl="1"/>
-            <a:r>
-              <a:rPr lang="pt-PT" dirty="0">
-                <a:solidFill>
-                  <a:schemeClr val="bg1"/>
-                </a:solidFill>
-              </a:rPr>
-              <a:t>Existe muita informação, muitos dados</a:t>
-            </a:r>
-          </a:p>
-          <a:p>
-            <a:pPr lvl="2"/>
-            <a:r>
-              <a:rPr lang="pt-PT" dirty="0">
-                <a:solidFill>
-                  <a:schemeClr val="bg1"/>
-                </a:solidFill>
-              </a:rPr>
-              <a:t>Em documentos não estruturados </a:t>
-            </a:r>
-          </a:p>
-          <a:p>
-            <a:pPr lvl="2"/>
-            <a:r>
-              <a:rPr lang="pt-PT" dirty="0">
-                <a:solidFill>
-                  <a:schemeClr val="bg1"/>
-                </a:solidFill>
-              </a:rPr>
-              <a:t>e estruturados em bases de dados</a:t>
-            </a:r>
-          </a:p>
-          <a:p>
-            <a:pPr lvl="1"/>
-            <a:endParaRPr lang="pt-PT" dirty="0">
-              <a:solidFill>
-                <a:schemeClr val="bg1"/>
-              </a:solidFill>
-            </a:endParaRPr>
-          </a:p>
-          <a:p>
-            <a:pPr lvl="1"/>
-            <a:r>
-              <a:rPr lang="pt-PT" dirty="0">
-                <a:solidFill>
-                  <a:schemeClr val="bg1"/>
-                </a:solidFill>
-              </a:rPr>
-              <a:t>É necessário organizar e melhorar o acesso integrado da informação</a:t>
-            </a:r>
-          </a:p>
-          <a:p>
-            <a:pPr lvl="1"/>
-            <a:endParaRPr lang="pt-PT" dirty="0">
-              <a:solidFill>
-                <a:schemeClr val="bg1"/>
-              </a:solidFill>
-            </a:endParaRPr>
-          </a:p>
-          <a:p>
-            <a:pPr lvl="1"/>
-            <a:r>
-              <a:rPr lang="pt-PT" dirty="0">
-                <a:solidFill>
-                  <a:schemeClr val="bg1"/>
-                </a:solidFill>
-              </a:rPr>
-              <a:t>Surgem ferramentas indexação e pesquisa de informação</a:t>
-            </a:r>
-          </a:p>
-          <a:p>
-            <a:endParaRPr lang="pt-PT" dirty="0">
-              <a:solidFill>
-                <a:schemeClr val="bg1"/>
-              </a:solidFill>
-            </a:endParaRPr>
-          </a:p>
-        </p:txBody>
-      </p:sp>
-    </p:spTree>
-    <p:extLst>
-      <p:ext uri="{BB962C8B-B14F-4D97-AF65-F5344CB8AC3E}">
-        <p14:creationId xmlns:p14="http://schemas.microsoft.com/office/powerpoint/2010/main" val="373284507"/>
-      </p:ext>
-    </p:extLst>
-  </p:cSld>
-  <p:clrMapOvr>
-    <a:masterClrMapping/>
-  </p:clrMapOvr>
-</p:sld>
-</file>
-
-<file path=ppt/slides/slide20.xml><?xml version="1.0" encoding="utf-8"?>
-<p:sld xmlns:a="http://schemas.openxmlformats.org/drawingml/2006/main" xmlns:r="http://schemas.openxmlformats.org/officeDocument/2006/relationships" xmlns:p="http://schemas.openxmlformats.org/presentationml/2006/main">
-  <p:cSld>
-    <p:spTree>
-      <p:nvGrpSpPr>
-        <p:cNvPr id="1" name=""/>
-        <p:cNvGrpSpPr/>
-        <p:nvPr/>
-      </p:nvGrpSpPr>
-      <p:grpSpPr>
-        <a:xfrm>
-          <a:off x="0" y="0"/>
-          <a:ext cx="0" cy="0"/>
-          <a:chOff x="0" y="0"/>
-          <a:chExt cx="0" cy="0"/>
-        </a:xfrm>
-      </p:grpSpPr>
-      <p:pic>
-        <p:nvPicPr>
-          <p:cNvPr id="5" name="Imagem 4"/>
-          <p:cNvPicPr>
-            <a:picLocks noChangeAspect="1"/>
-          </p:cNvPicPr>
-          <p:nvPr/>
-        </p:nvPicPr>
-        <p:blipFill>
-          <a:blip r:embed="rId2">
-            <a:extLst>
-              <a:ext uri="{28A0092B-C50C-407E-A947-70E740481C1C}">
-                <a14:useLocalDpi xmlns:a14="http://schemas.microsoft.com/office/drawing/2010/main" val="0"/>
-              </a:ext>
-            </a:extLst>
-          </a:blip>
-          <a:stretch>
-            <a:fillRect/>
-          </a:stretch>
-        </p:blipFill>
-        <p:spPr>
-          <a:xfrm>
-            <a:off x="2359476" y="845003"/>
-            <a:ext cx="7078437" cy="5137575"/>
-          </a:xfrm>
-          <a:prstGeom prst="rect">
-            <a:avLst/>
-          </a:prstGeom>
-          <a:ln>
-            <a:noFill/>
-          </a:ln>
-          <a:effectLst>
-            <a:softEdge rad="112500"/>
-          </a:effectLst>
-        </p:spPr>
-      </p:pic>
-    </p:spTree>
-    <p:extLst>
-      <p:ext uri="{BB962C8B-B14F-4D97-AF65-F5344CB8AC3E}">
-        <p14:creationId xmlns:p14="http://schemas.microsoft.com/office/powerpoint/2010/main" val="327867623"/>
-      </p:ext>
-    </p:extLst>
-  </p:cSld>
-  <p:clrMapOvr>
-    <a:masterClrMapping/>
-  </p:clrMapOvr>
-</p:sld>
-</file>
-
 <file path=ppt/slides/slide21.xml><?xml version="1.0" encoding="utf-8"?>
 <p:sld xmlns:a="http://schemas.openxmlformats.org/drawingml/2006/main" xmlns:r="http://schemas.openxmlformats.org/officeDocument/2006/relationships" xmlns:p="http://schemas.openxmlformats.org/presentationml/2006/main">
   <p:cSld>
@@ -13095,73 +14406,294 @@
           <a:chExt cx="0" cy="0"/>
         </a:xfrm>
       </p:grpSpPr>
-      <p:sp>
-        <p:nvSpPr>
-          <p:cNvPr id="2" name="Título 1"/>
-          <p:cNvSpPr>
-            <a:spLocks noGrp="1"/>
-          </p:cNvSpPr>
-          <p:nvPr>
-            <p:ph type="title"/>
-          </p:nvPr>
-        </p:nvSpPr>
-        <p:spPr/>
-        <p:txBody>
-          <a:bodyPr/>
-          <a:lstStyle/>
-          <a:p>
-            <a:r>
-              <a:rPr lang="en-GB" dirty="0" err="1"/>
-              <a:t>Simulação</a:t>
-            </a:r>
-            <a:r>
-              <a:rPr lang="en-GB" dirty="0"/>
-              <a:t> e testes</a:t>
-            </a:r>
-            <a:endParaRPr lang="pt-PT" dirty="0"/>
-          </a:p>
-        </p:txBody>
-      </p:sp>
-      <p:sp>
-        <p:nvSpPr>
-          <p:cNvPr id="3" name="Marcador de Posição de Conteúdo 2"/>
-          <p:cNvSpPr>
-            <a:spLocks noGrp="1"/>
-          </p:cNvSpPr>
-          <p:nvPr>
-            <p:ph idx="1"/>
-          </p:nvPr>
-        </p:nvSpPr>
-        <p:spPr/>
-        <p:txBody>
-          <a:bodyPr/>
-          <a:lstStyle/>
-          <a:p>
-            <a:r>
-              <a:rPr lang="pt-PT" dirty="0">
-                <a:solidFill>
-                  <a:schemeClr val="bg1"/>
-                </a:solidFill>
-              </a:rPr>
-              <a:t>Maquina 1</a:t>
-            </a:r>
-          </a:p>
-          <a:p>
-            <a:r>
-              <a:rPr lang="pt-PT" dirty="0">
-                <a:solidFill>
-                  <a:schemeClr val="bg1"/>
-                </a:solidFill>
-              </a:rPr>
-              <a:t>Maquina 2</a:t>
-            </a:r>
-          </a:p>
-        </p:txBody>
-      </p:sp>
+      <p:grpSp>
+        <p:nvGrpSpPr>
+          <p:cNvPr id="2" name="Grupo 1"/>
+          <p:cNvGrpSpPr>
+            <a:grpSpLocks noChangeAspect="1"/>
+          </p:cNvGrpSpPr>
+          <p:nvPr/>
+        </p:nvGrpSpPr>
+        <p:grpSpPr>
+          <a:xfrm>
+            <a:off x="-28901" y="419100"/>
+            <a:ext cx="12220901" cy="6076950"/>
+            <a:chOff x="3200400" y="1989138"/>
+            <a:chExt cx="5791200" cy="2879725"/>
+          </a:xfrm>
+        </p:grpSpPr>
+        <p:pic>
+          <p:nvPicPr>
+            <p:cNvPr id="4" name="Imagem 3"/>
+            <p:cNvPicPr/>
+            <p:nvPr/>
+          </p:nvPicPr>
+          <p:blipFill rotWithShape="1">
+            <a:blip r:embed="rId2">
+              <a:extLst>
+                <a:ext uri="{28A0092B-C50C-407E-A947-70E740481C1C}">
+                  <a14:useLocalDpi xmlns:a14="http://schemas.microsoft.com/office/drawing/2010/main" val="0"/>
+                </a:ext>
+              </a:extLst>
+            </a:blip>
+            <a:srcRect l="5863" t="11922" r="7251" b="11211"/>
+            <a:stretch/>
+          </p:blipFill>
+          <p:spPr bwMode="auto">
+            <a:xfrm>
+              <a:off x="3200400" y="1989138"/>
+              <a:ext cx="5791200" cy="2879725"/>
+            </a:xfrm>
+            <a:prstGeom prst="rect">
+              <a:avLst/>
+            </a:prstGeom>
+            <a:ln>
+              <a:noFill/>
+            </a:ln>
+            <a:extLst>
+              <a:ext uri="{53640926-AAD7-44D8-BBD7-CCE9431645EC}">
+                <a14:shadowObscured xmlns:a14="http://schemas.microsoft.com/office/drawing/2010/main"/>
+              </a:ext>
+            </a:extLst>
+          </p:spPr>
+        </p:pic>
+        <p:sp>
+          <p:nvSpPr>
+            <p:cNvPr id="6" name="Retângulo 5"/>
+            <p:cNvSpPr/>
+            <p:nvPr/>
+          </p:nvSpPr>
+          <p:spPr>
+            <a:xfrm>
+              <a:off x="3400425" y="2703513"/>
+              <a:ext cx="1095375" cy="45085"/>
+            </a:xfrm>
+            <a:prstGeom prst="rect">
+              <a:avLst/>
+            </a:prstGeom>
+            <a:solidFill>
+              <a:schemeClr val="bg1">
+                <a:lumMod val="50000"/>
+                <a:lumOff val="50000"/>
+              </a:schemeClr>
+            </a:solidFill>
+            <a:ln>
+              <a:solidFill>
+                <a:schemeClr val="bg1">
+                  <a:lumMod val="50000"/>
+                  <a:lumOff val="50000"/>
+                </a:schemeClr>
+              </a:solidFill>
+            </a:ln>
+          </p:spPr>
+          <p:style>
+            <a:lnRef idx="2">
+              <a:schemeClr val="dk1">
+                <a:shade val="50000"/>
+              </a:schemeClr>
+            </a:lnRef>
+            <a:fillRef idx="1">
+              <a:schemeClr val="dk1"/>
+            </a:fillRef>
+            <a:effectRef idx="0">
+              <a:schemeClr val="dk1"/>
+            </a:effectRef>
+            <a:fontRef idx="minor">
+              <a:schemeClr val="lt1"/>
+            </a:fontRef>
+          </p:style>
+          <p:txBody>
+            <a:bodyPr rot="0" spcFirstLastPara="0" vert="horz" wrap="square" lIns="91440" tIns="45720" rIns="91440" bIns="45720" numCol="1" spcCol="0" rtlCol="0" fromWordArt="0" anchor="ctr" anchorCtr="0" forceAA="0" compatLnSpc="1">
+              <a:prstTxWarp prst="textNoShape">
+                <a:avLst/>
+              </a:prstTxWarp>
+              <a:noAutofit/>
+            </a:bodyPr>
+            <a:lstStyle/>
+            <a:p>
+              <a:endParaRPr lang="pt-PT"/>
+            </a:p>
+          </p:txBody>
+        </p:sp>
+        <p:sp>
+          <p:nvSpPr>
+            <p:cNvPr id="7" name="Retângulo 6"/>
+            <p:cNvSpPr/>
+            <p:nvPr/>
+          </p:nvSpPr>
+          <p:spPr>
+            <a:xfrm>
+              <a:off x="3390900" y="3341688"/>
+              <a:ext cx="1123950" cy="45085"/>
+            </a:xfrm>
+            <a:prstGeom prst="rect">
+              <a:avLst/>
+            </a:prstGeom>
+            <a:solidFill>
+              <a:schemeClr val="bg1">
+                <a:lumMod val="50000"/>
+                <a:lumOff val="50000"/>
+              </a:schemeClr>
+            </a:solidFill>
+            <a:ln>
+              <a:solidFill>
+                <a:schemeClr val="bg1">
+                  <a:lumMod val="50000"/>
+                  <a:lumOff val="50000"/>
+                </a:schemeClr>
+              </a:solidFill>
+            </a:ln>
+          </p:spPr>
+          <p:style>
+            <a:lnRef idx="2">
+              <a:schemeClr val="dk1">
+                <a:shade val="50000"/>
+              </a:schemeClr>
+            </a:lnRef>
+            <a:fillRef idx="1">
+              <a:schemeClr val="dk1"/>
+            </a:fillRef>
+            <a:effectRef idx="0">
+              <a:schemeClr val="dk1"/>
+            </a:effectRef>
+            <a:fontRef idx="minor">
+              <a:schemeClr val="lt1"/>
+            </a:fontRef>
+          </p:style>
+          <p:txBody>
+            <a:bodyPr rot="0" spcFirstLastPara="0" vert="horz" wrap="square" lIns="91440" tIns="45720" rIns="91440" bIns="45720" numCol="1" spcCol="0" rtlCol="0" fromWordArt="0" anchor="ctr" anchorCtr="0" forceAA="0" compatLnSpc="1">
+              <a:prstTxWarp prst="textNoShape">
+                <a:avLst/>
+              </a:prstTxWarp>
+              <a:noAutofit/>
+            </a:bodyPr>
+            <a:lstStyle/>
+            <a:p>
+              <a:endParaRPr lang="pt-PT"/>
+            </a:p>
+          </p:txBody>
+        </p:sp>
+        <p:sp>
+          <p:nvSpPr>
+            <p:cNvPr id="8" name="Retângulo 7"/>
+            <p:cNvSpPr/>
+            <p:nvPr/>
+          </p:nvSpPr>
+          <p:spPr>
+            <a:xfrm>
+              <a:off x="3390900" y="3979863"/>
+              <a:ext cx="1095375" cy="45085"/>
+            </a:xfrm>
+            <a:prstGeom prst="rect">
+              <a:avLst/>
+            </a:prstGeom>
+            <a:solidFill>
+              <a:schemeClr val="bg1">
+                <a:lumMod val="50000"/>
+                <a:lumOff val="50000"/>
+              </a:schemeClr>
+            </a:solidFill>
+            <a:ln>
+              <a:solidFill>
+                <a:schemeClr val="bg1">
+                  <a:lumMod val="50000"/>
+                  <a:lumOff val="50000"/>
+                </a:schemeClr>
+              </a:solidFill>
+            </a:ln>
+          </p:spPr>
+          <p:style>
+            <a:lnRef idx="2">
+              <a:schemeClr val="dk1">
+                <a:shade val="50000"/>
+              </a:schemeClr>
+            </a:lnRef>
+            <a:fillRef idx="1">
+              <a:schemeClr val="dk1"/>
+            </a:fillRef>
+            <a:effectRef idx="0">
+              <a:schemeClr val="dk1"/>
+            </a:effectRef>
+            <a:fontRef idx="minor">
+              <a:schemeClr val="lt1"/>
+            </a:fontRef>
+          </p:style>
+          <p:txBody>
+            <a:bodyPr rot="0" spcFirstLastPara="0" vert="horz" wrap="square" lIns="91440" tIns="45720" rIns="91440" bIns="45720" numCol="1" spcCol="0" rtlCol="0" fromWordArt="0" anchor="ctr" anchorCtr="0" forceAA="0" compatLnSpc="1">
+              <a:prstTxWarp prst="textNoShape">
+                <a:avLst/>
+              </a:prstTxWarp>
+              <a:noAutofit/>
+            </a:bodyPr>
+            <a:lstStyle/>
+            <a:p>
+              <a:endParaRPr lang="pt-PT"/>
+            </a:p>
+          </p:txBody>
+        </p:sp>
+        <p:sp>
+          <p:nvSpPr>
+            <p:cNvPr id="9" name="Retângulo 8"/>
+            <p:cNvSpPr/>
+            <p:nvPr/>
+          </p:nvSpPr>
+          <p:spPr>
+            <a:xfrm>
+              <a:off x="3390900" y="4541838"/>
+              <a:ext cx="1219200" cy="45085"/>
+            </a:xfrm>
+            <a:prstGeom prst="rect">
+              <a:avLst/>
+            </a:prstGeom>
+            <a:solidFill>
+              <a:schemeClr val="bg1">
+                <a:lumMod val="50000"/>
+                <a:lumOff val="50000"/>
+              </a:schemeClr>
+            </a:solidFill>
+            <a:ln>
+              <a:solidFill>
+                <a:schemeClr val="bg1">
+                  <a:lumMod val="50000"/>
+                  <a:lumOff val="50000"/>
+                </a:schemeClr>
+              </a:solidFill>
+            </a:ln>
+          </p:spPr>
+          <p:style>
+            <a:lnRef idx="2">
+              <a:schemeClr val="dk1">
+                <a:shade val="50000"/>
+              </a:schemeClr>
+            </a:lnRef>
+            <a:fillRef idx="1">
+              <a:schemeClr val="dk1"/>
+            </a:fillRef>
+            <a:effectRef idx="0">
+              <a:schemeClr val="dk1"/>
+            </a:effectRef>
+            <a:fontRef idx="minor">
+              <a:schemeClr val="lt1"/>
+            </a:fontRef>
+          </p:style>
+          <p:txBody>
+            <a:bodyPr rot="0" spcFirstLastPara="0" vert="horz" wrap="square" lIns="91440" tIns="45720" rIns="91440" bIns="45720" numCol="1" spcCol="0" rtlCol="0" fromWordArt="0" anchor="ctr" anchorCtr="0" forceAA="0" compatLnSpc="1">
+              <a:prstTxWarp prst="textNoShape">
+                <a:avLst/>
+              </a:prstTxWarp>
+              <a:noAutofit/>
+            </a:bodyPr>
+            <a:lstStyle/>
+            <a:p>
+              <a:endParaRPr lang="pt-PT"/>
+            </a:p>
+          </p:txBody>
+        </p:sp>
+      </p:grpSp>
     </p:spTree>
     <p:extLst>
       <p:ext uri="{BB962C8B-B14F-4D97-AF65-F5344CB8AC3E}">
-        <p14:creationId xmlns:p14="http://schemas.microsoft.com/office/powerpoint/2010/main" val="1795974120"/>
+        <p14:creationId xmlns:p14="http://schemas.microsoft.com/office/powerpoint/2010/main" val="327867623"/>
       </p:ext>
     </p:extLst>
   </p:cSld>
@@ -13188,68 +14720,47 @@
           <a:chExt cx="0" cy="0"/>
         </a:xfrm>
       </p:grpSpPr>
-      <p:sp>
-        <p:nvSpPr>
-          <p:cNvPr id="2" name="Título 1"/>
-          <p:cNvSpPr>
-            <a:spLocks noGrp="1"/>
-          </p:cNvSpPr>
-          <p:nvPr>
-            <p:ph type="title"/>
-          </p:nvPr>
-        </p:nvSpPr>
-        <p:spPr/>
-        <p:txBody>
-          <a:bodyPr/>
-          <a:lstStyle/>
-          <a:p>
-            <a:r>
-              <a:rPr lang="en-GB" dirty="0" err="1"/>
-              <a:t>Simulação</a:t>
-            </a:r>
-            <a:r>
-              <a:rPr lang="en-GB" dirty="0"/>
-              <a:t> e Testes</a:t>
-            </a:r>
-            <a:endParaRPr lang="pt-PT" dirty="0"/>
-          </a:p>
-        </p:txBody>
-      </p:sp>
-      <p:sp>
-        <p:nvSpPr>
-          <p:cNvPr id="3" name="Marcador de Posição de Conteúdo 2"/>
-          <p:cNvSpPr>
-            <a:spLocks noGrp="1"/>
-          </p:cNvSpPr>
-          <p:nvPr>
-            <p:ph idx="1"/>
-          </p:nvPr>
-        </p:nvSpPr>
-        <p:spPr/>
-        <p:txBody>
-          <a:bodyPr/>
-          <a:lstStyle/>
-          <a:p>
-            <a:r>
-              <a:rPr lang="en-GB" dirty="0" err="1">
-                <a:solidFill>
-                  <a:schemeClr val="bg1"/>
-                </a:solidFill>
-              </a:rPr>
-              <a:t>Resultados</a:t>
-            </a:r>
-            <a:endParaRPr lang="pt-PT" dirty="0">
-              <a:solidFill>
-                <a:schemeClr val="bg1"/>
-              </a:solidFill>
-            </a:endParaRPr>
-          </a:p>
-        </p:txBody>
-      </p:sp>
+      <p:pic>
+        <p:nvPicPr>
+          <p:cNvPr id="10" name="Imagem 9"/>
+          <p:cNvPicPr>
+            <a:picLocks noChangeAspect="1"/>
+          </p:cNvPicPr>
+          <p:nvPr/>
+        </p:nvPicPr>
+        <p:blipFill rotWithShape="1">
+          <a:blip r:embed="rId2">
+            <a:extLst>
+              <a:ext uri="{28A0092B-C50C-407E-A947-70E740481C1C}">
+                <a14:useLocalDpi xmlns:a14="http://schemas.microsoft.com/office/drawing/2010/main" val="0"/>
+              </a:ext>
+            </a:extLst>
+          </a:blip>
+          <a:srcRect l="7056" t="10982" r="7915" b="67684"/>
+          <a:stretch/>
+        </p:blipFill>
+        <p:spPr bwMode="auto">
+          <a:xfrm>
+            <a:off x="20241" y="2571750"/>
+            <a:ext cx="12151518" cy="1714500"/>
+          </a:xfrm>
+          <a:prstGeom prst="rect">
+            <a:avLst/>
+          </a:prstGeom>
+          <a:ln>
+            <a:noFill/>
+          </a:ln>
+          <a:extLst>
+            <a:ext uri="{53640926-AAD7-44D8-BBD7-CCE9431645EC}">
+              <a14:shadowObscured xmlns:a14="http://schemas.microsoft.com/office/drawing/2010/main"/>
+            </a:ext>
+          </a:extLst>
+        </p:spPr>
+      </p:pic>
     </p:spTree>
     <p:extLst>
       <p:ext uri="{BB962C8B-B14F-4D97-AF65-F5344CB8AC3E}">
-        <p14:creationId xmlns:p14="http://schemas.microsoft.com/office/powerpoint/2010/main" val="2965183767"/>
+        <p14:creationId xmlns:p14="http://schemas.microsoft.com/office/powerpoint/2010/main" val="649060010"/>
       </p:ext>
     </p:extLst>
   </p:cSld>
@@ -13292,18 +14803,1653 @@
           <a:lstStyle/>
           <a:p>
             <a:r>
-              <a:rPr lang="en-GB" dirty="0" err="1"/>
-              <a:t>Trabalho</a:t>
-            </a:r>
-            <a:r>
-              <a:rPr lang="en-GB" dirty="0"/>
-              <a:t> </a:t>
-            </a:r>
-            <a:r>
-              <a:rPr lang="en-GB" dirty="0" err="1"/>
-              <a:t>Futuro</a:t>
-            </a:r>
-            <a:endParaRPr lang="pt-PT" dirty="0"/>
+              <a:rPr lang="pt-PT" dirty="0"/>
+              <a:t>Simulação e Testes</a:t>
+            </a:r>
+          </a:p>
+        </p:txBody>
+      </p:sp>
+      <p:graphicFrame>
+        <p:nvGraphicFramePr>
+          <p:cNvPr id="4" name="Marcador de Posição de Conteúdo 3"/>
+          <p:cNvGraphicFramePr>
+            <a:graphicFrameLocks noGrp="1"/>
+          </p:cNvGraphicFramePr>
+          <p:nvPr>
+            <p:ph idx="1"/>
+            <p:extLst>
+              <p:ext uri="{D42A27DB-BD31-4B8C-83A1-F6EECF244321}">
+                <p14:modId xmlns:p14="http://schemas.microsoft.com/office/powerpoint/2010/main" val="2335384635"/>
+              </p:ext>
+            </p:extLst>
+          </p:nvPr>
+        </p:nvGraphicFramePr>
+        <p:xfrm>
+          <a:off x="1848188" y="2876551"/>
+          <a:ext cx="8445994" cy="2965036"/>
+        </p:xfrm>
+        <a:graphic>
+          <a:graphicData uri="http://schemas.openxmlformats.org/drawingml/2006/table">
+            <a:tbl>
+              <a:tblPr firstRow="1" firstCol="1" bandRow="1">
+                <a:tableStyleId>{5C22544A-7EE6-4342-B048-85BDC9FD1C3A}</a:tableStyleId>
+              </a:tblPr>
+              <a:tblGrid>
+                <a:gridCol w="2423287">
+                  <a:extLst>
+                    <a:ext uri="{9D8B030D-6E8A-4147-A177-3AD203B41FA5}">
+                      <a16:colId xmlns:a16="http://schemas.microsoft.com/office/drawing/2014/main" val="4161356131"/>
+                    </a:ext>
+                  </a:extLst>
+                </a:gridCol>
+                <a:gridCol w="2952485">
+                  <a:extLst>
+                    <a:ext uri="{9D8B030D-6E8A-4147-A177-3AD203B41FA5}">
+                      <a16:colId xmlns:a16="http://schemas.microsoft.com/office/drawing/2014/main" val="3579591438"/>
+                    </a:ext>
+                  </a:extLst>
+                </a:gridCol>
+                <a:gridCol w="3070222">
+                  <a:extLst>
+                    <a:ext uri="{9D8B030D-6E8A-4147-A177-3AD203B41FA5}">
+                      <a16:colId xmlns:a16="http://schemas.microsoft.com/office/drawing/2014/main" val="1057592089"/>
+                    </a:ext>
+                  </a:extLst>
+                </a:gridCol>
+              </a:tblGrid>
+              <a:tr h="476746">
+                <a:tc>
+                  <a:txBody>
+                    <a:bodyPr/>
+                    <a:lstStyle/>
+                    <a:p>
+                      <a:pPr indent="288290" algn="ctr">
+                        <a:lnSpc>
+                          <a:spcPts val="1700"/>
+                        </a:lnSpc>
+                        <a:spcAft>
+                          <a:spcPts val="0"/>
+                        </a:spcAft>
+                      </a:pPr>
+                      <a:r>
+                        <a:rPr lang="pt-PT" sz="1800" dirty="0">
+                          <a:effectLst/>
+                        </a:rPr>
+                        <a:t> </a:t>
+                      </a:r>
+                      <a:endParaRPr lang="pt-PT" sz="1800" dirty="0">
+                        <a:effectLst/>
+                        <a:latin typeface="Times" panose="02020603050405020304" pitchFamily="18" charset="0"/>
+                        <a:ea typeface="Nimbus Sans L"/>
+                        <a:cs typeface="Times New Roman" panose="02020603050405020304" pitchFamily="18" charset="0"/>
+                      </a:endParaRPr>
+                    </a:p>
+                  </a:txBody>
+                  <a:tcPr marL="68580" marR="68580" marT="0" marB="0" anchor="ctr"/>
+                </a:tc>
+                <a:tc>
+                  <a:txBody>
+                    <a:bodyPr/>
+                    <a:lstStyle/>
+                    <a:p>
+                      <a:pPr indent="288290" algn="ctr">
+                        <a:lnSpc>
+                          <a:spcPts val="1700"/>
+                        </a:lnSpc>
+                        <a:spcAft>
+                          <a:spcPts val="0"/>
+                        </a:spcAft>
+                      </a:pPr>
+                      <a:r>
+                        <a:rPr lang="pt-PT" sz="1800" dirty="0">
+                          <a:effectLst/>
+                        </a:rPr>
+                        <a:t>Máquina 1</a:t>
+                      </a:r>
+                      <a:endParaRPr lang="pt-PT" sz="1800" dirty="0">
+                        <a:effectLst/>
+                        <a:latin typeface="Times" panose="02020603050405020304" pitchFamily="18" charset="0"/>
+                        <a:ea typeface="Nimbus Sans L"/>
+                        <a:cs typeface="Times New Roman" panose="02020603050405020304" pitchFamily="18" charset="0"/>
+                      </a:endParaRPr>
+                    </a:p>
+                  </a:txBody>
+                  <a:tcPr marL="68580" marR="68580" marT="0" marB="0" anchor="ctr"/>
+                </a:tc>
+                <a:tc>
+                  <a:txBody>
+                    <a:bodyPr/>
+                    <a:lstStyle/>
+                    <a:p>
+                      <a:pPr indent="288290" algn="ctr">
+                        <a:lnSpc>
+                          <a:spcPts val="1700"/>
+                        </a:lnSpc>
+                        <a:spcAft>
+                          <a:spcPts val="0"/>
+                        </a:spcAft>
+                      </a:pPr>
+                      <a:r>
+                        <a:rPr lang="pt-PT" sz="1800">
+                          <a:effectLst/>
+                        </a:rPr>
+                        <a:t>Máquina 2</a:t>
+                      </a:r>
+                      <a:endParaRPr lang="pt-PT" sz="1800">
+                        <a:effectLst/>
+                        <a:latin typeface="Times" panose="02020603050405020304" pitchFamily="18" charset="0"/>
+                        <a:ea typeface="Nimbus Sans L"/>
+                        <a:cs typeface="Times New Roman" panose="02020603050405020304" pitchFamily="18" charset="0"/>
+                      </a:endParaRPr>
+                    </a:p>
+                  </a:txBody>
+                  <a:tcPr marL="68580" marR="68580" marT="0" marB="0" anchor="ctr"/>
+                </a:tc>
+                <a:extLst>
+                  <a:ext uri="{0D108BD9-81ED-4DB2-BD59-A6C34878D82A}">
+                    <a16:rowId xmlns:a16="http://schemas.microsoft.com/office/drawing/2014/main" val="2765902993"/>
+                  </a:ext>
+                </a:extLst>
+              </a:tr>
+              <a:tr h="1005772">
+                <a:tc>
+                  <a:txBody>
+                    <a:bodyPr/>
+                    <a:lstStyle/>
+                    <a:p>
+                      <a:pPr indent="288290" algn="ctr">
+                        <a:lnSpc>
+                          <a:spcPts val="1700"/>
+                        </a:lnSpc>
+                        <a:spcAft>
+                          <a:spcPts val="0"/>
+                        </a:spcAft>
+                      </a:pPr>
+                      <a:r>
+                        <a:rPr lang="pt-PT" sz="1800" dirty="0">
+                          <a:effectLst/>
+                        </a:rPr>
+                        <a:t>Processador</a:t>
+                      </a:r>
+                      <a:endParaRPr lang="pt-PT" sz="1800" dirty="0">
+                        <a:effectLst/>
+                        <a:latin typeface="Times" panose="02020603050405020304" pitchFamily="18" charset="0"/>
+                        <a:ea typeface="Nimbus Sans L"/>
+                        <a:cs typeface="Times New Roman" panose="02020603050405020304" pitchFamily="18" charset="0"/>
+                      </a:endParaRPr>
+                    </a:p>
+                  </a:txBody>
+                  <a:tcPr marL="68580" marR="68580" marT="0" marB="0" anchor="ctr"/>
+                </a:tc>
+                <a:tc>
+                  <a:txBody>
+                    <a:bodyPr/>
+                    <a:lstStyle/>
+                    <a:p>
+                      <a:pPr indent="288290" algn="ctr">
+                        <a:lnSpc>
+                          <a:spcPts val="1700"/>
+                        </a:lnSpc>
+                        <a:spcAft>
+                          <a:spcPts val="0"/>
+                        </a:spcAft>
+                      </a:pPr>
+                      <a:r>
+                        <a:rPr lang="pt-PT" sz="1800" dirty="0" err="1">
+                          <a:effectLst/>
+                        </a:rPr>
+                        <a:t>Genuine</a:t>
+                      </a:r>
+                      <a:r>
+                        <a:rPr lang="pt-PT" sz="1800" dirty="0">
+                          <a:effectLst/>
+                        </a:rPr>
+                        <a:t> Intel® CPU U7300 @1.30GHz</a:t>
+                      </a:r>
+                      <a:endParaRPr lang="pt-PT" sz="1800" dirty="0">
+                        <a:effectLst/>
+                        <a:latin typeface="Times" panose="02020603050405020304" pitchFamily="18" charset="0"/>
+                        <a:ea typeface="Nimbus Sans L"/>
+                        <a:cs typeface="Times New Roman" panose="02020603050405020304" pitchFamily="18" charset="0"/>
+                      </a:endParaRPr>
+                    </a:p>
+                  </a:txBody>
+                  <a:tcPr marL="68580" marR="68580" marT="0" marB="0" anchor="ctr"/>
+                </a:tc>
+                <a:tc>
+                  <a:txBody>
+                    <a:bodyPr/>
+                    <a:lstStyle/>
+                    <a:p>
+                      <a:pPr indent="288290" algn="ctr">
+                        <a:lnSpc>
+                          <a:spcPts val="1700"/>
+                        </a:lnSpc>
+                        <a:spcAft>
+                          <a:spcPts val="0"/>
+                        </a:spcAft>
+                      </a:pPr>
+                      <a:r>
+                        <a:rPr lang="pt-PT" sz="1800">
+                          <a:effectLst/>
+                        </a:rPr>
+                        <a:t>Intel® Core™ i7-4510U CPU @ 2.00GHz</a:t>
+                      </a:r>
+                      <a:endParaRPr lang="pt-PT" sz="1800">
+                        <a:effectLst/>
+                        <a:latin typeface="Times" panose="02020603050405020304" pitchFamily="18" charset="0"/>
+                        <a:ea typeface="Nimbus Sans L"/>
+                        <a:cs typeface="Times New Roman" panose="02020603050405020304" pitchFamily="18" charset="0"/>
+                      </a:endParaRPr>
+                    </a:p>
+                  </a:txBody>
+                  <a:tcPr marL="68580" marR="68580" marT="0" marB="0" anchor="ctr"/>
+                </a:tc>
+                <a:extLst>
+                  <a:ext uri="{0D108BD9-81ED-4DB2-BD59-A6C34878D82A}">
+                    <a16:rowId xmlns:a16="http://schemas.microsoft.com/office/drawing/2014/main" val="3147651359"/>
+                  </a:ext>
+                </a:extLst>
+              </a:tr>
+              <a:tr h="476746">
+                <a:tc>
+                  <a:txBody>
+                    <a:bodyPr/>
+                    <a:lstStyle/>
+                    <a:p>
+                      <a:pPr indent="288290" algn="ctr">
+                        <a:lnSpc>
+                          <a:spcPts val="1700"/>
+                        </a:lnSpc>
+                        <a:spcAft>
+                          <a:spcPts val="0"/>
+                        </a:spcAft>
+                      </a:pPr>
+                      <a:r>
+                        <a:rPr lang="pt-PT" sz="1800">
+                          <a:effectLst/>
+                        </a:rPr>
+                        <a:t>RAM</a:t>
+                      </a:r>
+                      <a:endParaRPr lang="pt-PT" sz="1800">
+                        <a:effectLst/>
+                        <a:latin typeface="Times" panose="02020603050405020304" pitchFamily="18" charset="0"/>
+                        <a:ea typeface="Nimbus Sans L"/>
+                        <a:cs typeface="Times New Roman" panose="02020603050405020304" pitchFamily="18" charset="0"/>
+                      </a:endParaRPr>
+                    </a:p>
+                  </a:txBody>
+                  <a:tcPr marL="68580" marR="68580" marT="0" marB="0" anchor="ctr"/>
+                </a:tc>
+                <a:tc>
+                  <a:txBody>
+                    <a:bodyPr/>
+                    <a:lstStyle/>
+                    <a:p>
+                      <a:pPr indent="288290" algn="ctr">
+                        <a:lnSpc>
+                          <a:spcPts val="1700"/>
+                        </a:lnSpc>
+                        <a:spcAft>
+                          <a:spcPts val="0"/>
+                        </a:spcAft>
+                      </a:pPr>
+                      <a:r>
+                        <a:rPr lang="pt-PT" sz="1800" dirty="0">
+                          <a:effectLst/>
+                        </a:rPr>
+                        <a:t>4GB</a:t>
+                      </a:r>
+                      <a:endParaRPr lang="pt-PT" sz="1800" dirty="0">
+                        <a:effectLst/>
+                        <a:latin typeface="Times" panose="02020603050405020304" pitchFamily="18" charset="0"/>
+                        <a:ea typeface="Nimbus Sans L"/>
+                        <a:cs typeface="Times New Roman" panose="02020603050405020304" pitchFamily="18" charset="0"/>
+                      </a:endParaRPr>
+                    </a:p>
+                  </a:txBody>
+                  <a:tcPr marL="68580" marR="68580" marT="0" marB="0" anchor="ctr"/>
+                </a:tc>
+                <a:tc>
+                  <a:txBody>
+                    <a:bodyPr/>
+                    <a:lstStyle/>
+                    <a:p>
+                      <a:pPr indent="288290" algn="ctr">
+                        <a:lnSpc>
+                          <a:spcPts val="1700"/>
+                        </a:lnSpc>
+                        <a:spcAft>
+                          <a:spcPts val="0"/>
+                        </a:spcAft>
+                      </a:pPr>
+                      <a:r>
+                        <a:rPr lang="pt-PT" sz="1800" dirty="0">
+                          <a:effectLst/>
+                        </a:rPr>
+                        <a:t>8GB</a:t>
+                      </a:r>
+                      <a:endParaRPr lang="pt-PT" sz="1800" dirty="0">
+                        <a:effectLst/>
+                        <a:latin typeface="Times" panose="02020603050405020304" pitchFamily="18" charset="0"/>
+                        <a:ea typeface="Nimbus Sans L"/>
+                        <a:cs typeface="Times New Roman" panose="02020603050405020304" pitchFamily="18" charset="0"/>
+                      </a:endParaRPr>
+                    </a:p>
+                  </a:txBody>
+                  <a:tcPr marL="68580" marR="68580" marT="0" marB="0" anchor="ctr"/>
+                </a:tc>
+                <a:extLst>
+                  <a:ext uri="{0D108BD9-81ED-4DB2-BD59-A6C34878D82A}">
+                    <a16:rowId xmlns:a16="http://schemas.microsoft.com/office/drawing/2014/main" val="1733000875"/>
+                  </a:ext>
+                </a:extLst>
+              </a:tr>
+              <a:tr h="1005772">
+                <a:tc>
+                  <a:txBody>
+                    <a:bodyPr/>
+                    <a:lstStyle/>
+                    <a:p>
+                      <a:pPr indent="288290" algn="ctr">
+                        <a:lnSpc>
+                          <a:spcPts val="1700"/>
+                        </a:lnSpc>
+                        <a:spcAft>
+                          <a:spcPts val="0"/>
+                        </a:spcAft>
+                      </a:pPr>
+                      <a:r>
+                        <a:rPr lang="pt-PT" sz="1800">
+                          <a:effectLst/>
+                        </a:rPr>
+                        <a:t>Sistema Operativo</a:t>
+                      </a:r>
+                      <a:endParaRPr lang="pt-PT" sz="1800">
+                        <a:effectLst/>
+                        <a:latin typeface="Times" panose="02020603050405020304" pitchFamily="18" charset="0"/>
+                        <a:ea typeface="Nimbus Sans L"/>
+                        <a:cs typeface="Times New Roman" panose="02020603050405020304" pitchFamily="18" charset="0"/>
+                      </a:endParaRPr>
+                    </a:p>
+                  </a:txBody>
+                  <a:tcPr marL="68580" marR="68580" marT="0" marB="0" anchor="ctr"/>
+                </a:tc>
+                <a:tc>
+                  <a:txBody>
+                    <a:bodyPr/>
+                    <a:lstStyle/>
+                    <a:p>
+                      <a:pPr indent="288290" algn="ctr">
+                        <a:lnSpc>
+                          <a:spcPts val="1700"/>
+                        </a:lnSpc>
+                        <a:spcAft>
+                          <a:spcPts val="0"/>
+                        </a:spcAft>
+                      </a:pPr>
+                      <a:r>
+                        <a:rPr lang="pt-PT" sz="1800" dirty="0">
+                          <a:effectLst/>
+                        </a:rPr>
+                        <a:t>Windows 7 64bits</a:t>
+                      </a:r>
+                      <a:endParaRPr lang="pt-PT" sz="1800" dirty="0">
+                        <a:effectLst/>
+                        <a:latin typeface="Times" panose="02020603050405020304" pitchFamily="18" charset="0"/>
+                        <a:ea typeface="Nimbus Sans L"/>
+                        <a:cs typeface="Times New Roman" panose="02020603050405020304" pitchFamily="18" charset="0"/>
+                      </a:endParaRPr>
+                    </a:p>
+                  </a:txBody>
+                  <a:tcPr marL="68580" marR="68580" marT="0" marB="0" anchor="ctr"/>
+                </a:tc>
+                <a:tc>
+                  <a:txBody>
+                    <a:bodyPr/>
+                    <a:lstStyle/>
+                    <a:p>
+                      <a:pPr indent="288290" algn="ctr">
+                        <a:lnSpc>
+                          <a:spcPts val="1700"/>
+                        </a:lnSpc>
+                        <a:spcAft>
+                          <a:spcPts val="0"/>
+                        </a:spcAft>
+                      </a:pPr>
+                      <a:r>
+                        <a:rPr lang="pt-PT" sz="1800" dirty="0">
+                          <a:effectLst/>
+                        </a:rPr>
+                        <a:t>Windows 10 64 bits</a:t>
+                      </a:r>
+                      <a:endParaRPr lang="pt-PT" sz="1800" dirty="0">
+                        <a:effectLst/>
+                        <a:latin typeface="Times" panose="02020603050405020304" pitchFamily="18" charset="0"/>
+                        <a:ea typeface="Nimbus Sans L"/>
+                        <a:cs typeface="Times New Roman" panose="02020603050405020304" pitchFamily="18" charset="0"/>
+                      </a:endParaRPr>
+                    </a:p>
+                  </a:txBody>
+                  <a:tcPr marL="68580" marR="68580" marT="0" marB="0" anchor="ctr"/>
+                </a:tc>
+                <a:extLst>
+                  <a:ext uri="{0D108BD9-81ED-4DB2-BD59-A6C34878D82A}">
+                    <a16:rowId xmlns:a16="http://schemas.microsoft.com/office/drawing/2014/main" val="2780701533"/>
+                  </a:ext>
+                </a:extLst>
+              </a:tr>
+            </a:tbl>
+          </a:graphicData>
+        </a:graphic>
+      </p:graphicFrame>
+    </p:spTree>
+    <p:extLst>
+      <p:ext uri="{BB962C8B-B14F-4D97-AF65-F5344CB8AC3E}">
+        <p14:creationId xmlns:p14="http://schemas.microsoft.com/office/powerpoint/2010/main" val="1795974120"/>
+      </p:ext>
+    </p:extLst>
+  </p:cSld>
+  <p:clrMapOvr>
+    <a:masterClrMapping/>
+  </p:clrMapOvr>
+</p:sld>
+</file>
+
+<file path=ppt/slides/slide24.xml><?xml version="1.0" encoding="utf-8"?>
+<p:sld xmlns:a="http://schemas.openxmlformats.org/drawingml/2006/main" xmlns:r="http://schemas.openxmlformats.org/officeDocument/2006/relationships" xmlns:p="http://schemas.openxmlformats.org/presentationml/2006/main">
+  <p:cSld>
+    <p:spTree>
+      <p:nvGrpSpPr>
+        <p:cNvPr id="1" name=""/>
+        <p:cNvGrpSpPr/>
+        <p:nvPr/>
+      </p:nvGrpSpPr>
+      <p:grpSpPr>
+        <a:xfrm>
+          <a:off x="0" y="0"/>
+          <a:ext cx="0" cy="0"/>
+          <a:chOff x="0" y="0"/>
+          <a:chExt cx="0" cy="0"/>
+        </a:xfrm>
+      </p:grpSpPr>
+      <p:sp>
+        <p:nvSpPr>
+          <p:cNvPr id="2" name="Título 1"/>
+          <p:cNvSpPr>
+            <a:spLocks noGrp="1"/>
+          </p:cNvSpPr>
+          <p:nvPr>
+            <p:ph type="title"/>
+          </p:nvPr>
+        </p:nvSpPr>
+        <p:spPr/>
+        <p:txBody>
+          <a:bodyPr/>
+          <a:lstStyle/>
+          <a:p>
+            <a:r>
+              <a:rPr lang="pt-PT" dirty="0"/>
+              <a:t>Simulação e Testes</a:t>
+            </a:r>
+          </a:p>
+        </p:txBody>
+      </p:sp>
+      <p:graphicFrame>
+        <p:nvGraphicFramePr>
+          <p:cNvPr id="6" name="Marcador de Posição de Conteúdo 5"/>
+          <p:cNvGraphicFramePr>
+            <a:graphicFrameLocks noGrp="1"/>
+          </p:cNvGraphicFramePr>
+          <p:nvPr>
+            <p:ph idx="1"/>
+            <p:extLst>
+              <p:ext uri="{D42A27DB-BD31-4B8C-83A1-F6EECF244321}">
+                <p14:modId xmlns:p14="http://schemas.microsoft.com/office/powerpoint/2010/main" val="3486855429"/>
+              </p:ext>
+            </p:extLst>
+          </p:nvPr>
+        </p:nvGraphicFramePr>
+        <p:xfrm>
+          <a:off x="511835" y="2628898"/>
+          <a:ext cx="11128374" cy="3390901"/>
+        </p:xfrm>
+        <a:graphic>
+          <a:graphicData uri="http://schemas.openxmlformats.org/drawingml/2006/table">
+            <a:tbl>
+              <a:tblPr firstRow="1" firstCol="1" bandRow="1">
+                <a:tableStyleId>{5C22544A-7EE6-4342-B048-85BDC9FD1C3A}</a:tableStyleId>
+              </a:tblPr>
+              <a:tblGrid>
+                <a:gridCol w="3182938">
+                  <a:extLst>
+                    <a:ext uri="{9D8B030D-6E8A-4147-A177-3AD203B41FA5}">
+                      <a16:colId xmlns:a16="http://schemas.microsoft.com/office/drawing/2014/main" val="3880297361"/>
+                    </a:ext>
+                  </a:extLst>
+                </a:gridCol>
+                <a:gridCol w="1557338">
+                  <a:extLst>
+                    <a:ext uri="{9D8B030D-6E8A-4147-A177-3AD203B41FA5}">
+                      <a16:colId xmlns:a16="http://schemas.microsoft.com/office/drawing/2014/main" val="4269124583"/>
+                    </a:ext>
+                  </a:extLst>
+                </a:gridCol>
+                <a:gridCol w="1230312">
+                  <a:extLst>
+                    <a:ext uri="{9D8B030D-6E8A-4147-A177-3AD203B41FA5}">
+                      <a16:colId xmlns:a16="http://schemas.microsoft.com/office/drawing/2014/main" val="1191066584"/>
+                    </a:ext>
+                  </a:extLst>
+                </a:gridCol>
+                <a:gridCol w="1350962">
+                  <a:extLst>
+                    <a:ext uri="{9D8B030D-6E8A-4147-A177-3AD203B41FA5}">
+                      <a16:colId xmlns:a16="http://schemas.microsoft.com/office/drawing/2014/main" val="2560896128"/>
+                    </a:ext>
+                  </a:extLst>
+                </a:gridCol>
+                <a:gridCol w="1350962">
+                  <a:extLst>
+                    <a:ext uri="{9D8B030D-6E8A-4147-A177-3AD203B41FA5}">
+                      <a16:colId xmlns:a16="http://schemas.microsoft.com/office/drawing/2014/main" val="1972909710"/>
+                    </a:ext>
+                  </a:extLst>
+                </a:gridCol>
+                <a:gridCol w="1104900">
+                  <a:extLst>
+                    <a:ext uri="{9D8B030D-6E8A-4147-A177-3AD203B41FA5}">
+                      <a16:colId xmlns:a16="http://schemas.microsoft.com/office/drawing/2014/main" val="2678044349"/>
+                    </a:ext>
+                  </a:extLst>
+                </a:gridCol>
+                <a:gridCol w="1350962">
+                  <a:extLst>
+                    <a:ext uri="{9D8B030D-6E8A-4147-A177-3AD203B41FA5}">
+                      <a16:colId xmlns:a16="http://schemas.microsoft.com/office/drawing/2014/main" val="2005367396"/>
+                    </a:ext>
+                  </a:extLst>
+                </a:gridCol>
+              </a:tblGrid>
+              <a:tr h="359257">
+                <a:tc>
+                  <a:txBody>
+                    <a:bodyPr/>
+                    <a:lstStyle/>
+                    <a:p>
+                      <a:pPr indent="288290" algn="ctr">
+                        <a:lnSpc>
+                          <a:spcPts val="1700"/>
+                        </a:lnSpc>
+                        <a:spcAft>
+                          <a:spcPts val="600"/>
+                        </a:spcAft>
+                      </a:pPr>
+                      <a:r>
+                        <a:rPr lang="pt-PT" sz="1800">
+                          <a:effectLst/>
+                        </a:rPr>
+                        <a:t> </a:t>
+                      </a:r>
+                      <a:endParaRPr lang="pt-PT" sz="1800">
+                        <a:effectLst/>
+                        <a:latin typeface="Times" panose="02020603050405020304" pitchFamily="18" charset="0"/>
+                        <a:ea typeface="Nimbus Sans L"/>
+                        <a:cs typeface="Times New Roman" panose="02020603050405020304" pitchFamily="18" charset="0"/>
+                      </a:endParaRPr>
+                    </a:p>
+                  </a:txBody>
+                  <a:tcPr marL="68580" marR="68580" marT="0" marB="0" anchor="ctr"/>
+                </a:tc>
+                <a:tc gridSpan="3">
+                  <a:txBody>
+                    <a:bodyPr/>
+                    <a:lstStyle/>
+                    <a:p>
+                      <a:pPr indent="288290" algn="ctr">
+                        <a:lnSpc>
+                          <a:spcPts val="1700"/>
+                        </a:lnSpc>
+                        <a:spcAft>
+                          <a:spcPts val="600"/>
+                        </a:spcAft>
+                      </a:pPr>
+                      <a:r>
+                        <a:rPr lang="pt-PT" sz="1800" dirty="0">
+                          <a:effectLst/>
+                        </a:rPr>
+                        <a:t>Máquina 1</a:t>
+                      </a:r>
+                      <a:endParaRPr lang="pt-PT" sz="1800" dirty="0">
+                        <a:effectLst/>
+                        <a:latin typeface="Times" panose="02020603050405020304" pitchFamily="18" charset="0"/>
+                        <a:ea typeface="Nimbus Sans L"/>
+                        <a:cs typeface="Times New Roman" panose="02020603050405020304" pitchFamily="18" charset="0"/>
+                      </a:endParaRPr>
+                    </a:p>
+                  </a:txBody>
+                  <a:tcPr marL="68580" marR="68580" marT="0" marB="0" anchor="ctr"/>
+                </a:tc>
+                <a:tc hMerge="1">
+                  <a:txBody>
+                    <a:bodyPr/>
+                    <a:lstStyle/>
+                    <a:p>
+                      <a:endParaRPr lang="pt-PT"/>
+                    </a:p>
+                  </a:txBody>
+                  <a:tcPr/>
+                </a:tc>
+                <a:tc hMerge="1">
+                  <a:txBody>
+                    <a:bodyPr/>
+                    <a:lstStyle/>
+                    <a:p>
+                      <a:endParaRPr lang="pt-PT"/>
+                    </a:p>
+                  </a:txBody>
+                  <a:tcPr/>
+                </a:tc>
+                <a:tc gridSpan="3">
+                  <a:txBody>
+                    <a:bodyPr/>
+                    <a:lstStyle/>
+                    <a:p>
+                      <a:pPr indent="288290" algn="ctr">
+                        <a:lnSpc>
+                          <a:spcPts val="1700"/>
+                        </a:lnSpc>
+                        <a:spcAft>
+                          <a:spcPts val="600"/>
+                        </a:spcAft>
+                      </a:pPr>
+                      <a:r>
+                        <a:rPr lang="pt-PT" sz="1800" dirty="0">
+                          <a:effectLst/>
+                        </a:rPr>
+                        <a:t>Máquina 2</a:t>
+                      </a:r>
+                      <a:endParaRPr lang="pt-PT" sz="1800" dirty="0">
+                        <a:effectLst/>
+                        <a:latin typeface="Times" panose="02020603050405020304" pitchFamily="18" charset="0"/>
+                        <a:ea typeface="Nimbus Sans L"/>
+                        <a:cs typeface="Times New Roman" panose="02020603050405020304" pitchFamily="18" charset="0"/>
+                      </a:endParaRPr>
+                    </a:p>
+                  </a:txBody>
+                  <a:tcPr marL="68580" marR="68580" marT="0" marB="0" anchor="ctr"/>
+                </a:tc>
+                <a:tc hMerge="1">
+                  <a:txBody>
+                    <a:bodyPr/>
+                    <a:lstStyle/>
+                    <a:p>
+                      <a:endParaRPr lang="pt-PT"/>
+                    </a:p>
+                  </a:txBody>
+                  <a:tcPr/>
+                </a:tc>
+                <a:tc hMerge="1">
+                  <a:txBody>
+                    <a:bodyPr/>
+                    <a:lstStyle/>
+                    <a:p>
+                      <a:endParaRPr lang="pt-PT"/>
+                    </a:p>
+                  </a:txBody>
+                  <a:tcPr/>
+                </a:tc>
+                <a:extLst>
+                  <a:ext uri="{0D108BD9-81ED-4DB2-BD59-A6C34878D82A}">
+                    <a16:rowId xmlns:a16="http://schemas.microsoft.com/office/drawing/2014/main" val="1580612932"/>
+                  </a:ext>
+                </a:extLst>
+              </a:tr>
+              <a:tr h="757911">
+                <a:tc>
+                  <a:txBody>
+                    <a:bodyPr/>
+                    <a:lstStyle/>
+                    <a:p>
+                      <a:pPr indent="288290" algn="just">
+                        <a:lnSpc>
+                          <a:spcPts val="1700"/>
+                        </a:lnSpc>
+                        <a:spcAft>
+                          <a:spcPts val="600"/>
+                        </a:spcAft>
+                      </a:pPr>
+                      <a:r>
+                        <a:rPr lang="pt-PT" sz="1800">
+                          <a:effectLst/>
+                        </a:rPr>
+                        <a:t>Tamanho da partição</a:t>
+                      </a:r>
+                      <a:endParaRPr lang="pt-PT" sz="1800">
+                        <a:effectLst/>
+                        <a:latin typeface="Times" panose="02020603050405020304" pitchFamily="18" charset="0"/>
+                        <a:ea typeface="Nimbus Sans L"/>
+                        <a:cs typeface="Times New Roman" panose="02020603050405020304" pitchFamily="18" charset="0"/>
+                      </a:endParaRPr>
+                    </a:p>
+                  </a:txBody>
+                  <a:tcPr marL="68580" marR="68580" marT="0" marB="0" anchor="ctr"/>
+                </a:tc>
+                <a:tc>
+                  <a:txBody>
+                    <a:bodyPr/>
+                    <a:lstStyle/>
+                    <a:p>
+                      <a:pPr indent="288290" algn="ctr">
+                        <a:lnSpc>
+                          <a:spcPts val="1700"/>
+                        </a:lnSpc>
+                        <a:spcAft>
+                          <a:spcPts val="600"/>
+                        </a:spcAft>
+                      </a:pPr>
+                      <a:r>
+                        <a:rPr lang="pt-PT" sz="1800" dirty="0">
+                          <a:effectLst/>
+                        </a:rPr>
+                        <a:t>100</a:t>
+                      </a:r>
+                      <a:endParaRPr lang="pt-PT" sz="1800" dirty="0">
+                        <a:effectLst/>
+                        <a:latin typeface="Times" panose="02020603050405020304" pitchFamily="18" charset="0"/>
+                        <a:ea typeface="Nimbus Sans L"/>
+                        <a:cs typeface="Times New Roman" panose="02020603050405020304" pitchFamily="18" charset="0"/>
+                      </a:endParaRPr>
+                    </a:p>
+                  </a:txBody>
+                  <a:tcPr marL="68580" marR="68580" marT="0" marB="0" anchor="ctr"/>
+                </a:tc>
+                <a:tc>
+                  <a:txBody>
+                    <a:bodyPr/>
+                    <a:lstStyle/>
+                    <a:p>
+                      <a:pPr indent="288290" algn="ctr">
+                        <a:lnSpc>
+                          <a:spcPts val="1700"/>
+                        </a:lnSpc>
+                        <a:spcAft>
+                          <a:spcPts val="600"/>
+                        </a:spcAft>
+                      </a:pPr>
+                      <a:r>
+                        <a:rPr lang="pt-PT" sz="1800">
+                          <a:effectLst/>
+                        </a:rPr>
+                        <a:t>500</a:t>
+                      </a:r>
+                      <a:endParaRPr lang="pt-PT" sz="1800">
+                        <a:effectLst/>
+                        <a:latin typeface="Times" panose="02020603050405020304" pitchFamily="18" charset="0"/>
+                        <a:ea typeface="Nimbus Sans L"/>
+                        <a:cs typeface="Times New Roman" panose="02020603050405020304" pitchFamily="18" charset="0"/>
+                      </a:endParaRPr>
+                    </a:p>
+                  </a:txBody>
+                  <a:tcPr marL="68580" marR="68580" marT="0" marB="0" anchor="ctr"/>
+                </a:tc>
+                <a:tc>
+                  <a:txBody>
+                    <a:bodyPr/>
+                    <a:lstStyle/>
+                    <a:p>
+                      <a:pPr indent="288290" algn="ctr">
+                        <a:lnSpc>
+                          <a:spcPts val="1700"/>
+                        </a:lnSpc>
+                        <a:spcAft>
+                          <a:spcPts val="600"/>
+                        </a:spcAft>
+                      </a:pPr>
+                      <a:r>
+                        <a:rPr lang="pt-PT" sz="1800">
+                          <a:effectLst/>
+                        </a:rPr>
+                        <a:t>1000</a:t>
+                      </a:r>
+                      <a:endParaRPr lang="pt-PT" sz="1800">
+                        <a:effectLst/>
+                        <a:latin typeface="Times" panose="02020603050405020304" pitchFamily="18" charset="0"/>
+                        <a:ea typeface="Nimbus Sans L"/>
+                        <a:cs typeface="Times New Roman" panose="02020603050405020304" pitchFamily="18" charset="0"/>
+                      </a:endParaRPr>
+                    </a:p>
+                  </a:txBody>
+                  <a:tcPr marL="68580" marR="68580" marT="0" marB="0" anchor="ctr"/>
+                </a:tc>
+                <a:tc>
+                  <a:txBody>
+                    <a:bodyPr/>
+                    <a:lstStyle/>
+                    <a:p>
+                      <a:pPr indent="288290" algn="ctr">
+                        <a:lnSpc>
+                          <a:spcPts val="1700"/>
+                        </a:lnSpc>
+                        <a:spcAft>
+                          <a:spcPts val="600"/>
+                        </a:spcAft>
+                      </a:pPr>
+                      <a:r>
+                        <a:rPr lang="pt-PT" sz="1800">
+                          <a:effectLst/>
+                        </a:rPr>
+                        <a:t>100</a:t>
+                      </a:r>
+                      <a:endParaRPr lang="pt-PT" sz="1800">
+                        <a:effectLst/>
+                        <a:latin typeface="Times" panose="02020603050405020304" pitchFamily="18" charset="0"/>
+                        <a:ea typeface="Nimbus Sans L"/>
+                        <a:cs typeface="Times New Roman" panose="02020603050405020304" pitchFamily="18" charset="0"/>
+                      </a:endParaRPr>
+                    </a:p>
+                  </a:txBody>
+                  <a:tcPr marL="68580" marR="68580" marT="0" marB="0" anchor="ctr"/>
+                </a:tc>
+                <a:tc>
+                  <a:txBody>
+                    <a:bodyPr/>
+                    <a:lstStyle/>
+                    <a:p>
+                      <a:pPr indent="288290" algn="ctr">
+                        <a:lnSpc>
+                          <a:spcPts val="1700"/>
+                        </a:lnSpc>
+                        <a:spcAft>
+                          <a:spcPts val="600"/>
+                        </a:spcAft>
+                      </a:pPr>
+                      <a:r>
+                        <a:rPr lang="pt-PT" sz="1800">
+                          <a:effectLst/>
+                        </a:rPr>
+                        <a:t>500</a:t>
+                      </a:r>
+                      <a:endParaRPr lang="pt-PT" sz="1800">
+                        <a:effectLst/>
+                        <a:latin typeface="Times" panose="02020603050405020304" pitchFamily="18" charset="0"/>
+                        <a:ea typeface="Nimbus Sans L"/>
+                        <a:cs typeface="Times New Roman" panose="02020603050405020304" pitchFamily="18" charset="0"/>
+                      </a:endParaRPr>
+                    </a:p>
+                  </a:txBody>
+                  <a:tcPr marL="68580" marR="68580" marT="0" marB="0" anchor="ctr"/>
+                </a:tc>
+                <a:tc>
+                  <a:txBody>
+                    <a:bodyPr/>
+                    <a:lstStyle/>
+                    <a:p>
+                      <a:pPr indent="288290" algn="ctr">
+                        <a:lnSpc>
+                          <a:spcPts val="1700"/>
+                        </a:lnSpc>
+                        <a:spcAft>
+                          <a:spcPts val="600"/>
+                        </a:spcAft>
+                      </a:pPr>
+                      <a:r>
+                        <a:rPr lang="pt-PT" sz="1800">
+                          <a:effectLst/>
+                        </a:rPr>
+                        <a:t>1000</a:t>
+                      </a:r>
+                      <a:endParaRPr lang="pt-PT" sz="1800">
+                        <a:effectLst/>
+                        <a:latin typeface="Times" panose="02020603050405020304" pitchFamily="18" charset="0"/>
+                        <a:ea typeface="Nimbus Sans L"/>
+                        <a:cs typeface="Times New Roman" panose="02020603050405020304" pitchFamily="18" charset="0"/>
+                      </a:endParaRPr>
+                    </a:p>
+                  </a:txBody>
+                  <a:tcPr marL="68580" marR="68580" marT="0" marB="0" anchor="ctr"/>
+                </a:tc>
+                <a:extLst>
+                  <a:ext uri="{0D108BD9-81ED-4DB2-BD59-A6C34878D82A}">
+                    <a16:rowId xmlns:a16="http://schemas.microsoft.com/office/drawing/2014/main" val="3261813198"/>
+                  </a:ext>
+                </a:extLst>
+              </a:tr>
+              <a:tr h="757911">
+                <a:tc>
+                  <a:txBody>
+                    <a:bodyPr/>
+                    <a:lstStyle/>
+                    <a:p>
+                      <a:pPr indent="288290" algn="just">
+                        <a:lnSpc>
+                          <a:spcPts val="1700"/>
+                        </a:lnSpc>
+                        <a:spcAft>
+                          <a:spcPts val="600"/>
+                        </a:spcAft>
+                      </a:pPr>
+                      <a:r>
+                        <a:rPr lang="pt-PT" sz="1800">
+                          <a:effectLst/>
+                        </a:rPr>
+                        <a:t>Processo de Indexação</a:t>
+                      </a:r>
+                      <a:endParaRPr lang="pt-PT" sz="1800">
+                        <a:effectLst/>
+                        <a:latin typeface="Times" panose="02020603050405020304" pitchFamily="18" charset="0"/>
+                        <a:ea typeface="Nimbus Sans L"/>
+                        <a:cs typeface="Times New Roman" panose="02020603050405020304" pitchFamily="18" charset="0"/>
+                      </a:endParaRPr>
+                    </a:p>
+                  </a:txBody>
+                  <a:tcPr marL="68580" marR="68580" marT="0" marB="0" anchor="ctr"/>
+                </a:tc>
+                <a:tc>
+                  <a:txBody>
+                    <a:bodyPr/>
+                    <a:lstStyle/>
+                    <a:p>
+                      <a:pPr indent="288290" algn="ctr">
+                        <a:lnSpc>
+                          <a:spcPts val="1700"/>
+                        </a:lnSpc>
+                        <a:spcAft>
+                          <a:spcPts val="600"/>
+                        </a:spcAft>
+                      </a:pPr>
+                      <a:r>
+                        <a:rPr lang="pt-PT" sz="1800">
+                          <a:effectLst/>
+                        </a:rPr>
+                        <a:t>1min20seg</a:t>
+                      </a:r>
+                      <a:endParaRPr lang="pt-PT" sz="1800">
+                        <a:effectLst/>
+                        <a:latin typeface="Times" panose="02020603050405020304" pitchFamily="18" charset="0"/>
+                        <a:ea typeface="Nimbus Sans L"/>
+                        <a:cs typeface="Times New Roman" panose="02020603050405020304" pitchFamily="18" charset="0"/>
+                      </a:endParaRPr>
+                    </a:p>
+                  </a:txBody>
+                  <a:tcPr marL="68580" marR="68580" marT="0" marB="0" anchor="ctr"/>
+                </a:tc>
+                <a:tc>
+                  <a:txBody>
+                    <a:bodyPr/>
+                    <a:lstStyle/>
+                    <a:p>
+                      <a:pPr indent="288290" algn="ctr">
+                        <a:lnSpc>
+                          <a:spcPts val="1700"/>
+                        </a:lnSpc>
+                        <a:spcAft>
+                          <a:spcPts val="600"/>
+                        </a:spcAft>
+                      </a:pPr>
+                      <a:r>
+                        <a:rPr lang="pt-PT" sz="1800">
+                          <a:effectLst/>
+                        </a:rPr>
+                        <a:t>33seg</a:t>
+                      </a:r>
+                      <a:endParaRPr lang="pt-PT" sz="1800">
+                        <a:effectLst/>
+                        <a:latin typeface="Times" panose="02020603050405020304" pitchFamily="18" charset="0"/>
+                        <a:ea typeface="Nimbus Sans L"/>
+                        <a:cs typeface="Times New Roman" panose="02020603050405020304" pitchFamily="18" charset="0"/>
+                      </a:endParaRPr>
+                    </a:p>
+                  </a:txBody>
+                  <a:tcPr marL="68580" marR="68580" marT="0" marB="0" anchor="ctr"/>
+                </a:tc>
+                <a:tc>
+                  <a:txBody>
+                    <a:bodyPr/>
+                    <a:lstStyle/>
+                    <a:p>
+                      <a:pPr indent="288290" algn="ctr">
+                        <a:lnSpc>
+                          <a:spcPts val="1700"/>
+                        </a:lnSpc>
+                        <a:spcAft>
+                          <a:spcPts val="600"/>
+                        </a:spcAft>
+                      </a:pPr>
+                      <a:r>
+                        <a:rPr lang="pt-PT" sz="1800">
+                          <a:effectLst/>
+                        </a:rPr>
+                        <a:t>25seg</a:t>
+                      </a:r>
+                      <a:endParaRPr lang="pt-PT" sz="1800">
+                        <a:effectLst/>
+                        <a:latin typeface="Times" panose="02020603050405020304" pitchFamily="18" charset="0"/>
+                        <a:ea typeface="Nimbus Sans L"/>
+                        <a:cs typeface="Times New Roman" panose="02020603050405020304" pitchFamily="18" charset="0"/>
+                      </a:endParaRPr>
+                    </a:p>
+                  </a:txBody>
+                  <a:tcPr marL="68580" marR="68580" marT="0" marB="0" anchor="ctr"/>
+                </a:tc>
+                <a:tc>
+                  <a:txBody>
+                    <a:bodyPr/>
+                    <a:lstStyle/>
+                    <a:p>
+                      <a:pPr indent="288290" algn="ctr">
+                        <a:lnSpc>
+                          <a:spcPts val="1700"/>
+                        </a:lnSpc>
+                        <a:spcAft>
+                          <a:spcPts val="600"/>
+                        </a:spcAft>
+                      </a:pPr>
+                      <a:r>
+                        <a:rPr lang="pt-PT" sz="1800">
+                          <a:effectLst/>
+                        </a:rPr>
+                        <a:t>40seg</a:t>
+                      </a:r>
+                      <a:endParaRPr lang="pt-PT" sz="1800">
+                        <a:effectLst/>
+                        <a:latin typeface="Times" panose="02020603050405020304" pitchFamily="18" charset="0"/>
+                        <a:ea typeface="Nimbus Sans L"/>
+                        <a:cs typeface="Times New Roman" panose="02020603050405020304" pitchFamily="18" charset="0"/>
+                      </a:endParaRPr>
+                    </a:p>
+                  </a:txBody>
+                  <a:tcPr marL="68580" marR="68580" marT="0" marB="0" anchor="ctr"/>
+                </a:tc>
+                <a:tc>
+                  <a:txBody>
+                    <a:bodyPr/>
+                    <a:lstStyle/>
+                    <a:p>
+                      <a:pPr indent="288290" algn="ctr">
+                        <a:lnSpc>
+                          <a:spcPts val="1700"/>
+                        </a:lnSpc>
+                        <a:spcAft>
+                          <a:spcPts val="600"/>
+                        </a:spcAft>
+                      </a:pPr>
+                      <a:r>
+                        <a:rPr lang="pt-PT" sz="1800">
+                          <a:effectLst/>
+                        </a:rPr>
+                        <a:t>16seg</a:t>
+                      </a:r>
+                      <a:endParaRPr lang="pt-PT" sz="1800">
+                        <a:effectLst/>
+                        <a:latin typeface="Times" panose="02020603050405020304" pitchFamily="18" charset="0"/>
+                        <a:ea typeface="Nimbus Sans L"/>
+                        <a:cs typeface="Times New Roman" panose="02020603050405020304" pitchFamily="18" charset="0"/>
+                      </a:endParaRPr>
+                    </a:p>
+                  </a:txBody>
+                  <a:tcPr marL="68580" marR="68580" marT="0" marB="0" anchor="ctr"/>
+                </a:tc>
+                <a:tc>
+                  <a:txBody>
+                    <a:bodyPr/>
+                    <a:lstStyle/>
+                    <a:p>
+                      <a:pPr indent="288290" algn="ctr">
+                        <a:lnSpc>
+                          <a:spcPts val="1700"/>
+                        </a:lnSpc>
+                        <a:spcAft>
+                          <a:spcPts val="600"/>
+                        </a:spcAft>
+                      </a:pPr>
+                      <a:r>
+                        <a:rPr lang="pt-PT" sz="1800">
+                          <a:effectLst/>
+                        </a:rPr>
+                        <a:t>11seg</a:t>
+                      </a:r>
+                      <a:endParaRPr lang="pt-PT" sz="1800">
+                        <a:effectLst/>
+                        <a:latin typeface="Times" panose="02020603050405020304" pitchFamily="18" charset="0"/>
+                        <a:ea typeface="Nimbus Sans L"/>
+                        <a:cs typeface="Times New Roman" panose="02020603050405020304" pitchFamily="18" charset="0"/>
+                      </a:endParaRPr>
+                    </a:p>
+                  </a:txBody>
+                  <a:tcPr marL="68580" marR="68580" marT="0" marB="0" anchor="ctr"/>
+                </a:tc>
+                <a:extLst>
+                  <a:ext uri="{0D108BD9-81ED-4DB2-BD59-A6C34878D82A}">
+                    <a16:rowId xmlns:a16="http://schemas.microsoft.com/office/drawing/2014/main" val="3788586605"/>
+                  </a:ext>
+                </a:extLst>
+              </a:tr>
+              <a:tr h="757911">
+                <a:tc>
+                  <a:txBody>
+                    <a:bodyPr/>
+                    <a:lstStyle/>
+                    <a:p>
+                      <a:pPr indent="288290" algn="just">
+                        <a:lnSpc>
+                          <a:spcPts val="1700"/>
+                        </a:lnSpc>
+                        <a:spcAft>
+                          <a:spcPts val="600"/>
+                        </a:spcAft>
+                      </a:pPr>
+                      <a:r>
+                        <a:rPr lang="pt-PT" sz="1800">
+                          <a:effectLst/>
+                        </a:rPr>
+                        <a:t>Processo de Mapeamento</a:t>
+                      </a:r>
+                      <a:endParaRPr lang="pt-PT" sz="1800">
+                        <a:effectLst/>
+                        <a:latin typeface="Times" panose="02020603050405020304" pitchFamily="18" charset="0"/>
+                        <a:ea typeface="Nimbus Sans L"/>
+                        <a:cs typeface="Times New Roman" panose="02020603050405020304" pitchFamily="18" charset="0"/>
+                      </a:endParaRPr>
+                    </a:p>
+                  </a:txBody>
+                  <a:tcPr marL="68580" marR="68580" marT="0" marB="0" anchor="ctr"/>
+                </a:tc>
+                <a:tc>
+                  <a:txBody>
+                    <a:bodyPr/>
+                    <a:lstStyle/>
+                    <a:p>
+                      <a:pPr indent="288290" algn="ctr">
+                        <a:lnSpc>
+                          <a:spcPts val="1700"/>
+                        </a:lnSpc>
+                        <a:spcAft>
+                          <a:spcPts val="600"/>
+                        </a:spcAft>
+                      </a:pPr>
+                      <a:r>
+                        <a:rPr lang="pt-PT" sz="1800">
+                          <a:effectLst/>
+                        </a:rPr>
+                        <a:t>3h50min</a:t>
+                      </a:r>
+                      <a:endParaRPr lang="pt-PT" sz="1800">
+                        <a:effectLst/>
+                        <a:latin typeface="Times" panose="02020603050405020304" pitchFamily="18" charset="0"/>
+                        <a:ea typeface="Nimbus Sans L"/>
+                        <a:cs typeface="Times New Roman" panose="02020603050405020304" pitchFamily="18" charset="0"/>
+                      </a:endParaRPr>
+                    </a:p>
+                  </a:txBody>
+                  <a:tcPr marL="68580" marR="68580" marT="0" marB="0" anchor="ctr"/>
+                </a:tc>
+                <a:tc>
+                  <a:txBody>
+                    <a:bodyPr/>
+                    <a:lstStyle/>
+                    <a:p>
+                      <a:pPr indent="288290" algn="ctr">
+                        <a:lnSpc>
+                          <a:spcPts val="1700"/>
+                        </a:lnSpc>
+                        <a:spcAft>
+                          <a:spcPts val="600"/>
+                        </a:spcAft>
+                      </a:pPr>
+                      <a:r>
+                        <a:rPr lang="pt-PT" sz="1800">
+                          <a:effectLst/>
+                        </a:rPr>
+                        <a:t>2h4min</a:t>
+                      </a:r>
+                      <a:endParaRPr lang="pt-PT" sz="1800">
+                        <a:effectLst/>
+                        <a:latin typeface="Times" panose="02020603050405020304" pitchFamily="18" charset="0"/>
+                        <a:ea typeface="Nimbus Sans L"/>
+                        <a:cs typeface="Times New Roman" panose="02020603050405020304" pitchFamily="18" charset="0"/>
+                      </a:endParaRPr>
+                    </a:p>
+                  </a:txBody>
+                  <a:tcPr marL="68580" marR="68580" marT="0" marB="0" anchor="ctr"/>
+                </a:tc>
+                <a:tc>
+                  <a:txBody>
+                    <a:bodyPr/>
+                    <a:lstStyle/>
+                    <a:p>
+                      <a:pPr indent="288290" algn="ctr">
+                        <a:lnSpc>
+                          <a:spcPts val="1700"/>
+                        </a:lnSpc>
+                        <a:spcAft>
+                          <a:spcPts val="600"/>
+                        </a:spcAft>
+                      </a:pPr>
+                      <a:r>
+                        <a:rPr lang="pt-PT" sz="1800">
+                          <a:effectLst/>
+                        </a:rPr>
+                        <a:t>3h37min</a:t>
+                      </a:r>
+                      <a:endParaRPr lang="pt-PT" sz="1800">
+                        <a:effectLst/>
+                        <a:latin typeface="Times" panose="02020603050405020304" pitchFamily="18" charset="0"/>
+                        <a:ea typeface="Nimbus Sans L"/>
+                        <a:cs typeface="Times New Roman" panose="02020603050405020304" pitchFamily="18" charset="0"/>
+                      </a:endParaRPr>
+                    </a:p>
+                  </a:txBody>
+                  <a:tcPr marL="68580" marR="68580" marT="0" marB="0" anchor="ctr"/>
+                </a:tc>
+                <a:tc>
+                  <a:txBody>
+                    <a:bodyPr/>
+                    <a:lstStyle/>
+                    <a:p>
+                      <a:pPr indent="288290" algn="ctr">
+                        <a:lnSpc>
+                          <a:spcPts val="1700"/>
+                        </a:lnSpc>
+                        <a:spcAft>
+                          <a:spcPts val="600"/>
+                        </a:spcAft>
+                      </a:pPr>
+                      <a:r>
+                        <a:rPr lang="pt-PT" sz="1800">
+                          <a:effectLst/>
+                        </a:rPr>
+                        <a:t>1h17min</a:t>
+                      </a:r>
+                      <a:endParaRPr lang="pt-PT" sz="1800">
+                        <a:effectLst/>
+                        <a:latin typeface="Times" panose="02020603050405020304" pitchFamily="18" charset="0"/>
+                        <a:ea typeface="Nimbus Sans L"/>
+                        <a:cs typeface="Times New Roman" panose="02020603050405020304" pitchFamily="18" charset="0"/>
+                      </a:endParaRPr>
+                    </a:p>
+                  </a:txBody>
+                  <a:tcPr marL="68580" marR="68580" marT="0" marB="0" anchor="ctr"/>
+                </a:tc>
+                <a:tc>
+                  <a:txBody>
+                    <a:bodyPr/>
+                    <a:lstStyle/>
+                    <a:p>
+                      <a:pPr indent="288290" algn="ctr">
+                        <a:lnSpc>
+                          <a:spcPts val="1700"/>
+                        </a:lnSpc>
+                        <a:spcAft>
+                          <a:spcPts val="600"/>
+                        </a:spcAft>
+                      </a:pPr>
+                      <a:r>
+                        <a:rPr lang="pt-PT" sz="1800">
+                          <a:effectLst/>
+                        </a:rPr>
+                        <a:t>56min</a:t>
+                      </a:r>
+                      <a:endParaRPr lang="pt-PT" sz="1800">
+                        <a:effectLst/>
+                        <a:latin typeface="Times" panose="02020603050405020304" pitchFamily="18" charset="0"/>
+                        <a:ea typeface="Nimbus Sans L"/>
+                        <a:cs typeface="Times New Roman" panose="02020603050405020304" pitchFamily="18" charset="0"/>
+                      </a:endParaRPr>
+                    </a:p>
+                  </a:txBody>
+                  <a:tcPr marL="68580" marR="68580" marT="0" marB="0" anchor="ctr"/>
+                </a:tc>
+                <a:tc>
+                  <a:txBody>
+                    <a:bodyPr/>
+                    <a:lstStyle/>
+                    <a:p>
+                      <a:pPr indent="288290" algn="ctr">
+                        <a:lnSpc>
+                          <a:spcPts val="1700"/>
+                        </a:lnSpc>
+                        <a:spcAft>
+                          <a:spcPts val="600"/>
+                        </a:spcAft>
+                      </a:pPr>
+                      <a:r>
+                        <a:rPr lang="pt-PT" sz="1800">
+                          <a:effectLst/>
+                        </a:rPr>
+                        <a:t>1h13min</a:t>
+                      </a:r>
+                      <a:endParaRPr lang="pt-PT" sz="1800">
+                        <a:effectLst/>
+                        <a:latin typeface="Times" panose="02020603050405020304" pitchFamily="18" charset="0"/>
+                        <a:ea typeface="Nimbus Sans L"/>
+                        <a:cs typeface="Times New Roman" panose="02020603050405020304" pitchFamily="18" charset="0"/>
+                      </a:endParaRPr>
+                    </a:p>
+                  </a:txBody>
+                  <a:tcPr marL="68580" marR="68580" marT="0" marB="0" anchor="ctr"/>
+                </a:tc>
+                <a:extLst>
+                  <a:ext uri="{0D108BD9-81ED-4DB2-BD59-A6C34878D82A}">
+                    <a16:rowId xmlns:a16="http://schemas.microsoft.com/office/drawing/2014/main" val="2803082765"/>
+                  </a:ext>
+                </a:extLst>
+              </a:tr>
+              <a:tr h="757911">
+                <a:tc>
+                  <a:txBody>
+                    <a:bodyPr/>
+                    <a:lstStyle/>
+                    <a:p>
+                      <a:pPr indent="288290" algn="just">
+                        <a:lnSpc>
+                          <a:spcPts val="1700"/>
+                        </a:lnSpc>
+                        <a:spcAft>
+                          <a:spcPts val="600"/>
+                        </a:spcAft>
+                      </a:pPr>
+                      <a:r>
+                        <a:rPr lang="pt-PT" sz="1800">
+                          <a:effectLst/>
+                        </a:rPr>
+                        <a:t>Todos os processos</a:t>
+                      </a:r>
+                      <a:endParaRPr lang="pt-PT" sz="1800">
+                        <a:effectLst/>
+                        <a:latin typeface="Times" panose="02020603050405020304" pitchFamily="18" charset="0"/>
+                        <a:ea typeface="Nimbus Sans L"/>
+                        <a:cs typeface="Times New Roman" panose="02020603050405020304" pitchFamily="18" charset="0"/>
+                      </a:endParaRPr>
+                    </a:p>
+                  </a:txBody>
+                  <a:tcPr marL="68580" marR="68580" marT="0" marB="0" anchor="ctr"/>
+                </a:tc>
+                <a:tc>
+                  <a:txBody>
+                    <a:bodyPr/>
+                    <a:lstStyle/>
+                    <a:p>
+                      <a:pPr indent="288290" algn="ctr">
+                        <a:lnSpc>
+                          <a:spcPts val="1700"/>
+                        </a:lnSpc>
+                        <a:spcAft>
+                          <a:spcPts val="600"/>
+                        </a:spcAft>
+                      </a:pPr>
+                      <a:r>
+                        <a:rPr lang="pt-PT" sz="1800">
+                          <a:effectLst/>
+                        </a:rPr>
+                        <a:t>3h52min</a:t>
+                      </a:r>
+                      <a:endParaRPr lang="pt-PT" sz="1800">
+                        <a:effectLst/>
+                        <a:latin typeface="Times" panose="02020603050405020304" pitchFamily="18" charset="0"/>
+                        <a:ea typeface="Nimbus Sans L"/>
+                        <a:cs typeface="Times New Roman" panose="02020603050405020304" pitchFamily="18" charset="0"/>
+                      </a:endParaRPr>
+                    </a:p>
+                  </a:txBody>
+                  <a:tcPr marL="68580" marR="68580" marT="0" marB="0" anchor="ctr"/>
+                </a:tc>
+                <a:tc>
+                  <a:txBody>
+                    <a:bodyPr/>
+                    <a:lstStyle/>
+                    <a:p>
+                      <a:pPr indent="288290" algn="ctr">
+                        <a:lnSpc>
+                          <a:spcPts val="1700"/>
+                        </a:lnSpc>
+                        <a:spcAft>
+                          <a:spcPts val="600"/>
+                        </a:spcAft>
+                      </a:pPr>
+                      <a:r>
+                        <a:rPr lang="pt-PT" sz="1800">
+                          <a:effectLst/>
+                        </a:rPr>
+                        <a:t>2h5min</a:t>
+                      </a:r>
+                      <a:endParaRPr lang="pt-PT" sz="1800">
+                        <a:effectLst/>
+                        <a:latin typeface="Times" panose="02020603050405020304" pitchFamily="18" charset="0"/>
+                        <a:ea typeface="Nimbus Sans L"/>
+                        <a:cs typeface="Times New Roman" panose="02020603050405020304" pitchFamily="18" charset="0"/>
+                      </a:endParaRPr>
+                    </a:p>
+                  </a:txBody>
+                  <a:tcPr marL="68580" marR="68580" marT="0" marB="0" anchor="ctr"/>
+                </a:tc>
+                <a:tc>
+                  <a:txBody>
+                    <a:bodyPr/>
+                    <a:lstStyle/>
+                    <a:p>
+                      <a:pPr indent="288290" algn="ctr">
+                        <a:lnSpc>
+                          <a:spcPts val="1700"/>
+                        </a:lnSpc>
+                        <a:spcAft>
+                          <a:spcPts val="600"/>
+                        </a:spcAft>
+                      </a:pPr>
+                      <a:r>
+                        <a:rPr lang="pt-PT" sz="1800">
+                          <a:effectLst/>
+                        </a:rPr>
+                        <a:t>3h38min</a:t>
+                      </a:r>
+                      <a:endParaRPr lang="pt-PT" sz="1800">
+                        <a:effectLst/>
+                        <a:latin typeface="Times" panose="02020603050405020304" pitchFamily="18" charset="0"/>
+                        <a:ea typeface="Nimbus Sans L"/>
+                        <a:cs typeface="Times New Roman" panose="02020603050405020304" pitchFamily="18" charset="0"/>
+                      </a:endParaRPr>
+                    </a:p>
+                  </a:txBody>
+                  <a:tcPr marL="68580" marR="68580" marT="0" marB="0" anchor="ctr"/>
+                </a:tc>
+                <a:tc>
+                  <a:txBody>
+                    <a:bodyPr/>
+                    <a:lstStyle/>
+                    <a:p>
+                      <a:pPr indent="288290" algn="ctr">
+                        <a:lnSpc>
+                          <a:spcPts val="1700"/>
+                        </a:lnSpc>
+                        <a:spcAft>
+                          <a:spcPts val="600"/>
+                        </a:spcAft>
+                      </a:pPr>
+                      <a:r>
+                        <a:rPr lang="pt-PT" sz="1800">
+                          <a:effectLst/>
+                        </a:rPr>
+                        <a:t>1h18min</a:t>
+                      </a:r>
+                      <a:endParaRPr lang="pt-PT" sz="1800">
+                        <a:effectLst/>
+                        <a:latin typeface="Times" panose="02020603050405020304" pitchFamily="18" charset="0"/>
+                        <a:ea typeface="Nimbus Sans L"/>
+                        <a:cs typeface="Times New Roman" panose="02020603050405020304" pitchFamily="18" charset="0"/>
+                      </a:endParaRPr>
+                    </a:p>
+                  </a:txBody>
+                  <a:tcPr marL="68580" marR="68580" marT="0" marB="0" anchor="ctr"/>
+                </a:tc>
+                <a:tc>
+                  <a:txBody>
+                    <a:bodyPr/>
+                    <a:lstStyle/>
+                    <a:p>
+                      <a:pPr indent="288290" algn="ctr">
+                        <a:lnSpc>
+                          <a:spcPts val="1700"/>
+                        </a:lnSpc>
+                        <a:spcAft>
+                          <a:spcPts val="600"/>
+                        </a:spcAft>
+                      </a:pPr>
+                      <a:r>
+                        <a:rPr lang="pt-PT" sz="1800">
+                          <a:effectLst/>
+                        </a:rPr>
+                        <a:t>57min</a:t>
+                      </a:r>
+                      <a:endParaRPr lang="pt-PT" sz="1800">
+                        <a:effectLst/>
+                        <a:latin typeface="Times" panose="02020603050405020304" pitchFamily="18" charset="0"/>
+                        <a:ea typeface="Nimbus Sans L"/>
+                        <a:cs typeface="Times New Roman" panose="02020603050405020304" pitchFamily="18" charset="0"/>
+                      </a:endParaRPr>
+                    </a:p>
+                  </a:txBody>
+                  <a:tcPr marL="68580" marR="68580" marT="0" marB="0" anchor="ctr"/>
+                </a:tc>
+                <a:tc>
+                  <a:txBody>
+                    <a:bodyPr/>
+                    <a:lstStyle/>
+                    <a:p>
+                      <a:pPr indent="288290" algn="ctr">
+                        <a:lnSpc>
+                          <a:spcPts val="1700"/>
+                        </a:lnSpc>
+                        <a:spcAft>
+                          <a:spcPts val="600"/>
+                        </a:spcAft>
+                      </a:pPr>
+                      <a:r>
+                        <a:rPr lang="pt-PT" sz="1800" dirty="0">
+                          <a:effectLst/>
+                        </a:rPr>
+                        <a:t>1h14min</a:t>
+                      </a:r>
+                      <a:endParaRPr lang="pt-PT" sz="1800" dirty="0">
+                        <a:effectLst/>
+                        <a:latin typeface="Times" panose="02020603050405020304" pitchFamily="18" charset="0"/>
+                        <a:ea typeface="Nimbus Sans L"/>
+                        <a:cs typeface="Times New Roman" panose="02020603050405020304" pitchFamily="18" charset="0"/>
+                      </a:endParaRPr>
+                    </a:p>
+                  </a:txBody>
+                  <a:tcPr marL="68580" marR="68580" marT="0" marB="0" anchor="ctr"/>
+                </a:tc>
+                <a:extLst>
+                  <a:ext uri="{0D108BD9-81ED-4DB2-BD59-A6C34878D82A}">
+                    <a16:rowId xmlns:a16="http://schemas.microsoft.com/office/drawing/2014/main" val="590309817"/>
+                  </a:ext>
+                </a:extLst>
+              </a:tr>
+            </a:tbl>
+          </a:graphicData>
+        </a:graphic>
+      </p:graphicFrame>
+    </p:spTree>
+    <p:extLst>
+      <p:ext uri="{BB962C8B-B14F-4D97-AF65-F5344CB8AC3E}">
+        <p14:creationId xmlns:p14="http://schemas.microsoft.com/office/powerpoint/2010/main" val="2965183767"/>
+      </p:ext>
+    </p:extLst>
+  </p:cSld>
+  <p:clrMapOvr>
+    <a:masterClrMapping/>
+  </p:clrMapOvr>
+</p:sld>
+</file>
+
+<file path=ppt/slides/slide25.xml><?xml version="1.0" encoding="utf-8"?>
+<p:sld xmlns:a="http://schemas.openxmlformats.org/drawingml/2006/main" xmlns:r="http://schemas.openxmlformats.org/officeDocument/2006/relationships" xmlns:p="http://schemas.openxmlformats.org/presentationml/2006/main">
+  <p:cSld>
+    <p:spTree>
+      <p:nvGrpSpPr>
+        <p:cNvPr id="1" name=""/>
+        <p:cNvGrpSpPr/>
+        <p:nvPr/>
+      </p:nvGrpSpPr>
+      <p:grpSpPr>
+        <a:xfrm>
+          <a:off x="0" y="0"/>
+          <a:ext cx="0" cy="0"/>
+          <a:chOff x="0" y="0"/>
+          <a:chExt cx="0" cy="0"/>
+        </a:xfrm>
+      </p:grpSpPr>
+      <p:sp>
+        <p:nvSpPr>
+          <p:cNvPr id="2" name="Título 1"/>
+          <p:cNvSpPr>
+            <a:spLocks noGrp="1"/>
+          </p:cNvSpPr>
+          <p:nvPr>
+            <p:ph type="title"/>
+          </p:nvPr>
+        </p:nvSpPr>
+        <p:spPr/>
+        <p:txBody>
+          <a:bodyPr/>
+          <a:lstStyle/>
+          <a:p>
+            <a:r>
+              <a:rPr lang="pt-PT" dirty="0"/>
+              <a:t>Conclusões e Satisfação dos Objetivos</a:t>
+            </a:r>
+          </a:p>
+        </p:txBody>
+      </p:sp>
+    </p:spTree>
+    <p:extLst>
+      <p:ext uri="{BB962C8B-B14F-4D97-AF65-F5344CB8AC3E}">
+        <p14:creationId xmlns:p14="http://schemas.microsoft.com/office/powerpoint/2010/main" val="265096303"/>
+      </p:ext>
+    </p:extLst>
+  </p:cSld>
+  <p:clrMapOvr>
+    <a:masterClrMapping/>
+  </p:clrMapOvr>
+</p:sld>
+</file>
+
+<file path=ppt/slides/slide26.xml><?xml version="1.0" encoding="utf-8"?>
+<p:sld xmlns:a="http://schemas.openxmlformats.org/drawingml/2006/main" xmlns:r="http://schemas.openxmlformats.org/officeDocument/2006/relationships" xmlns:p="http://schemas.openxmlformats.org/presentationml/2006/main">
+  <p:cSld>
+    <p:spTree>
+      <p:nvGrpSpPr>
+        <p:cNvPr id="1" name=""/>
+        <p:cNvGrpSpPr/>
+        <p:nvPr/>
+      </p:nvGrpSpPr>
+      <p:grpSpPr>
+        <a:xfrm>
+          <a:off x="0" y="0"/>
+          <a:ext cx="0" cy="0"/>
+          <a:chOff x="0" y="0"/>
+          <a:chExt cx="0" cy="0"/>
+        </a:xfrm>
+      </p:grpSpPr>
+      <p:sp>
+        <p:nvSpPr>
+          <p:cNvPr id="2" name="Título 1"/>
+          <p:cNvSpPr>
+            <a:spLocks noGrp="1"/>
+          </p:cNvSpPr>
+          <p:nvPr>
+            <p:ph type="title"/>
+          </p:nvPr>
+        </p:nvSpPr>
+        <p:spPr/>
+        <p:txBody>
+          <a:bodyPr/>
+          <a:lstStyle/>
+          <a:p>
+            <a:r>
+              <a:rPr lang="pt-PT" dirty="0"/>
+              <a:t>Trabalho Futuro</a:t>
+            </a:r>
           </a:p>
         </p:txBody>
       </p:sp>
@@ -13322,7 +16468,68 @@
           <a:bodyPr/>
           <a:lstStyle/>
           <a:p>
-            <a:endParaRPr lang="pt-PT"/>
+            <a:endParaRPr lang="en-GB" dirty="0">
+              <a:solidFill>
+                <a:schemeClr val="bg1"/>
+              </a:solidFill>
+            </a:endParaRPr>
+          </a:p>
+          <a:p>
+            <a:r>
+              <a:rPr lang="pt-PT" dirty="0">
+                <a:solidFill>
+                  <a:schemeClr val="bg1"/>
+                </a:solidFill>
+              </a:rPr>
+              <a:t>Pesquisa por hierarquia de doenças</a:t>
+            </a:r>
+          </a:p>
+          <a:p>
+            <a:endParaRPr lang="pt-PT" dirty="0">
+              <a:solidFill>
+                <a:schemeClr val="bg1"/>
+              </a:solidFill>
+            </a:endParaRPr>
+          </a:p>
+          <a:p>
+            <a:r>
+              <a:rPr lang="pt-PT" dirty="0">
+                <a:solidFill>
+                  <a:schemeClr val="bg1"/>
+                </a:solidFill>
+              </a:rPr>
+              <a:t>Dicionários de sinónimos e </a:t>
+            </a:r>
+            <a:r>
+              <a:rPr lang="pt-PT" i="1" dirty="0" err="1">
+                <a:solidFill>
+                  <a:schemeClr val="bg1"/>
+                </a:solidFill>
+              </a:rPr>
+              <a:t>spellcheck</a:t>
+            </a:r>
+            <a:endParaRPr lang="pt-PT" i="1" dirty="0">
+              <a:solidFill>
+                <a:schemeClr val="bg1"/>
+              </a:solidFill>
+            </a:endParaRPr>
+          </a:p>
+          <a:p>
+            <a:endParaRPr lang="pt-PT" dirty="0">
+              <a:solidFill>
+                <a:schemeClr val="bg1"/>
+              </a:solidFill>
+            </a:endParaRPr>
+          </a:p>
+          <a:p>
+            <a:r>
+              <a:rPr lang="pt-PT" dirty="0">
+                <a:solidFill>
+                  <a:schemeClr val="bg1"/>
+                </a:solidFill>
+              </a:rPr>
+              <a:t>Dividir o arquétipo existente em outros, para poder ser reaproveitado</a:t>
+            </a:r>
           </a:p>
         </p:txBody>
       </p:sp>
@@ -13330,6 +16537,107 @@
     <p:extLst>
       <p:ext uri="{BB962C8B-B14F-4D97-AF65-F5344CB8AC3E}">
         <p14:creationId xmlns:p14="http://schemas.microsoft.com/office/powerpoint/2010/main" val="1916820639"/>
+      </p:ext>
+    </p:extLst>
+  </p:cSld>
+  <p:clrMapOvr>
+    <a:masterClrMapping/>
+  </p:clrMapOvr>
+</p:sld>
+</file>
+
+<file path=ppt/slides/slide27.xml><?xml version="1.0" encoding="utf-8"?>
+<p:sld xmlns:a="http://schemas.openxmlformats.org/drawingml/2006/main" xmlns:r="http://schemas.openxmlformats.org/officeDocument/2006/relationships" xmlns:p="http://schemas.openxmlformats.org/presentationml/2006/main">
+  <p:cSld>
+    <p:spTree>
+      <p:nvGrpSpPr>
+        <p:cNvPr id="1" name=""/>
+        <p:cNvGrpSpPr/>
+        <p:nvPr/>
+      </p:nvGrpSpPr>
+      <p:grpSpPr>
+        <a:xfrm>
+          <a:off x="0" y="0"/>
+          <a:ext cx="0" cy="0"/>
+          <a:chOff x="0" y="0"/>
+          <a:chExt cx="0" cy="0"/>
+        </a:xfrm>
+      </p:grpSpPr>
+      <p:sp>
+        <p:nvSpPr>
+          <p:cNvPr id="2" name="Título 1"/>
+          <p:cNvSpPr>
+            <a:spLocks noGrp="1"/>
+          </p:cNvSpPr>
+          <p:nvPr>
+            <p:ph type="title"/>
+          </p:nvPr>
+        </p:nvSpPr>
+        <p:spPr/>
+        <p:txBody>
+          <a:bodyPr/>
+          <a:lstStyle/>
+          <a:p>
+            <a:endParaRPr lang="pt-PT" dirty="0"/>
+          </a:p>
+        </p:txBody>
+      </p:sp>
+      <p:pic>
+        <p:nvPicPr>
+          <p:cNvPr id="1026" name="Picture 2" descr="http://www.sepaloya.com/wp-content/uploads/2015/12/10243219_l-3.jpg"/>
+          <p:cNvPicPr>
+            <a:picLocks noGrp="1" noChangeAspect="1" noChangeArrowheads="1"/>
+          </p:cNvPicPr>
+          <p:nvPr>
+            <p:ph idx="1"/>
+          </p:nvPr>
+        </p:nvPicPr>
+        <p:blipFill>
+          <a:blip r:embed="rId3">
+            <a:extLst>
+              <a:ext uri="{28A0092B-C50C-407E-A947-70E740481C1C}">
+                <a14:useLocalDpi xmlns:a14="http://schemas.microsoft.com/office/drawing/2010/main" val="0"/>
+              </a:ext>
+            </a:extLst>
+          </a:blip>
+          <a:srcRect/>
+          <a:stretch>
+            <a:fillRect/>
+          </a:stretch>
+        </p:blipFill>
+        <p:spPr bwMode="auto">
+          <a:xfrm>
+            <a:off x="-477673" y="0"/>
+            <a:ext cx="13028352" cy="6858000"/>
+          </a:xfrm>
+          <a:prstGeom prst="rect">
+            <a:avLst/>
+          </a:prstGeom>
+          <a:ln>
+            <a:noFill/>
+          </a:ln>
+          <a:effectLst>
+            <a:outerShdw blurRad="292100" dist="139700" dir="2700000" algn="tl" rotWithShape="0">
+              <a:srgbClr val="333333">
+                <a:alpha val="65000"/>
+              </a:srgbClr>
+            </a:outerShdw>
+          </a:effectLst>
+          <a:extLst>
+            <a:ext uri="{909E8E84-426E-40DD-AFC4-6F175D3DCCD1}">
+              <a14:hiddenFill xmlns:a14="http://schemas.microsoft.com/office/drawing/2010/main">
+                <a:solidFill>
+                  <a:srgbClr val="FFFFFF"/>
+                </a:solidFill>
+              </a14:hiddenFill>
+            </a:ext>
+          </a:extLst>
+        </p:spPr>
+      </p:pic>
+    </p:spTree>
+    <p:extLst>
+      <p:ext uri="{BB962C8B-B14F-4D97-AF65-F5344CB8AC3E}">
+        <p14:creationId xmlns:p14="http://schemas.microsoft.com/office/powerpoint/2010/main" val="2350535860"/>
       </p:ext>
     </p:extLst>
   </p:cSld>
@@ -14261,6 +17569,52 @@
           </a:p>
         </p:txBody>
       </p:sp>
+      <p:sp>
+        <p:nvSpPr>
+          <p:cNvPr id="8" name="Oval 7"/>
+          <p:cNvSpPr/>
+          <p:nvPr/>
+        </p:nvSpPr>
+        <p:spPr>
+          <a:xfrm>
+            <a:off x="10972457" y="875957"/>
+            <a:ext cx="828000" cy="828000"/>
+          </a:xfrm>
+          <a:prstGeom prst="ellipse">
+            <a:avLst/>
+          </a:prstGeom>
+          <a:noFill/>
+          <a:ln w="50800">
+            <a:solidFill>
+              <a:schemeClr val="tx1"/>
+            </a:solidFill>
+          </a:ln>
+        </p:spPr>
+        <p:style>
+          <a:lnRef idx="2">
+            <a:schemeClr val="accent1">
+              <a:shade val="50000"/>
+            </a:schemeClr>
+          </a:lnRef>
+          <a:fillRef idx="1">
+            <a:schemeClr val="accent1"/>
+          </a:fillRef>
+          <a:effectRef idx="0">
+            <a:schemeClr val="accent1"/>
+          </a:effectRef>
+          <a:fontRef idx="minor">
+            <a:schemeClr val="lt1"/>
+          </a:fontRef>
+        </p:style>
+        <p:txBody>
+          <a:bodyPr rtlCol="0" anchor="ctr"/>
+          <a:lstStyle/>
+          <a:p>
+            <a:pPr algn="ctr"/>
+            <a:endParaRPr lang="pt-PT"/>
+          </a:p>
+        </p:txBody>
+      </p:sp>
     </p:spTree>
     <p:extLst>
       <p:ext uri="{BB962C8B-B14F-4D97-AF65-F5344CB8AC3E}">
@@ -14442,6 +17796,52 @@
               <a:t>1</a:t>
             </a:r>
             <a:endParaRPr lang="pt-PT" sz="3200" dirty="0"/>
+          </a:p>
+        </p:txBody>
+      </p:sp>
+      <p:sp>
+        <p:nvSpPr>
+          <p:cNvPr id="6" name="Oval 5"/>
+          <p:cNvSpPr/>
+          <p:nvPr/>
+        </p:nvSpPr>
+        <p:spPr>
+          <a:xfrm>
+            <a:off x="10972457" y="875957"/>
+            <a:ext cx="828000" cy="828000"/>
+          </a:xfrm>
+          <a:prstGeom prst="ellipse">
+            <a:avLst/>
+          </a:prstGeom>
+          <a:noFill/>
+          <a:ln w="50800">
+            <a:solidFill>
+              <a:schemeClr val="tx1"/>
+            </a:solidFill>
+          </a:ln>
+        </p:spPr>
+        <p:style>
+          <a:lnRef idx="2">
+            <a:schemeClr val="accent1">
+              <a:shade val="50000"/>
+            </a:schemeClr>
+          </a:lnRef>
+          <a:fillRef idx="1">
+            <a:schemeClr val="accent1"/>
+          </a:fillRef>
+          <a:effectRef idx="0">
+            <a:schemeClr val="accent1"/>
+          </a:effectRef>
+          <a:fontRef idx="minor">
+            <a:schemeClr val="lt1"/>
+          </a:fontRef>
+        </p:style>
+        <p:txBody>
+          <a:bodyPr rtlCol="0" anchor="ctr"/>
+          <a:lstStyle/>
+          <a:p>
+            <a:pPr algn="ctr"/>
+            <a:endParaRPr lang="pt-PT"/>
           </a:p>
         </p:txBody>
       </p:sp>

</xml_diff>